<commit_message>
update presentation and add 30% for 80% yeses cutoff study
</commit_message>
<xml_diff>
--- a/BankMarketing.pptx
+++ b/BankMarketing.pptx
@@ -4139,16 +4139,24 @@
             </a:r>
           </a:p>
           <a:p>
+            <a:pPr>
+              <a:lnSpc>
+                <a:spcPct val="90000"/>
+              </a:lnSpc>
+            </a:pPr>
+            <a:r>
+              <a:rPr lang="en-US" sz="1100" dirty="0"/>
+              <a:t>Mixed strategy is strategy of identifying as positives any clients for which the model predicts their probability of saying a yes as at least 30%</a:t>
+            </a:r>
+          </a:p>
+          <a:p>
             <a:pPr marL="0" indent="0">
               <a:lnSpc>
                 <a:spcPct val="90000"/>
               </a:lnSpc>
               <a:buNone/>
             </a:pPr>
-            <a:r>
-              <a:rPr lang="en-US" sz="1100" dirty="0"/>
-              <a:t> </a:t>
-            </a:r>
+            <a:endParaRPr lang="en-US" sz="1100" dirty="0"/>
           </a:p>
           <a:p>
             <a:pPr lvl="1">
@@ -4183,14 +4191,14 @@
           <p:nvPr>
             <p:extLst>
               <p:ext uri="{D42A27DB-BD31-4B8C-83A1-F6EECF244321}">
-                <p14:modId xmlns:p14="http://schemas.microsoft.com/office/powerpoint/2010/main" val="1311957506"/>
+                <p14:modId xmlns:p14="http://schemas.microsoft.com/office/powerpoint/2010/main" val="4162853071"/>
               </p:ext>
             </p:extLst>
           </p:nvPr>
         </p:nvGraphicFramePr>
         <p:xfrm>
-          <a:off x="978416" y="2068219"/>
-          <a:ext cx="6558191" cy="2729507"/>
+          <a:off x="978416" y="2068220"/>
+          <a:ext cx="6558191" cy="3898652"/>
         </p:xfrm>
         <a:graphic>
           <a:graphicData uri="http://schemas.openxmlformats.org/drawingml/2006/table">
@@ -4236,7 +4244,7 @@
                   </a:extLst>
                 </a:gridCol>
               </a:tblGrid>
-              <a:tr h="644551">
+              <a:tr h="546088">
                 <a:tc>
                   <a:txBody>
                     <a:bodyPr/>
@@ -4546,7 +4554,7 @@
                   </a:ext>
                 </a:extLst>
               </a:tr>
-              <a:tr h="493248">
+              <a:tr h="417898">
                 <a:tc>
                   <a:txBody>
                     <a:bodyPr/>
@@ -4787,14 +4795,14 @@
                   </a:ext>
                 </a:extLst>
               </a:tr>
-              <a:tr h="644551">
+              <a:tr h="546088">
                 <a:tc>
                   <a:txBody>
                     <a:bodyPr/>
                     <a:lstStyle/>
                     <a:p>
                       <a:r>
-                        <a:rPr lang="en-US" sz="1000" cap="none" spc="0">
+                        <a:rPr lang="en-US" sz="1000" cap="none" spc="0" dirty="0">
                           <a:solidFill>
                             <a:schemeClr val="tx1"/>
                           </a:solidFill>
@@ -4917,7 +4925,7 @@
                     <a:lstStyle/>
                     <a:p>
                       <a:r>
-                        <a:rPr lang="en-US" sz="1000" cap="none" spc="0">
+                        <a:rPr lang="en-US" sz="1000" cap="none" spc="0" dirty="0">
                           <a:solidFill>
                             <a:schemeClr val="tx1"/>
                           </a:solidFill>
@@ -4927,7 +4935,7 @@
                     </a:p>
                     <a:p>
                       <a:r>
-                        <a:rPr lang="en-US" sz="1000" cap="none" spc="0">
+                        <a:rPr lang="en-US" sz="1000" cap="none" spc="0" dirty="0">
                           <a:solidFill>
                             <a:schemeClr val="tx1"/>
                           </a:solidFill>
@@ -4968,7 +4976,7 @@
                     <a:lstStyle/>
                     <a:p>
                       <a:r>
-                        <a:rPr lang="en-US" sz="1000" cap="none" spc="0">
+                        <a:rPr lang="en-US" sz="1000" cap="none" spc="0" dirty="0">
                           <a:solidFill>
                             <a:schemeClr val="tx1"/>
                           </a:solidFill>
@@ -4978,7 +4986,7 @@
                     </a:p>
                     <a:p>
                       <a:r>
-                        <a:rPr lang="en-US" sz="1000" cap="none" spc="0">
+                        <a:rPr lang="en-US" sz="1000" cap="none" spc="0" dirty="0">
                           <a:solidFill>
                             <a:schemeClr val="tx1"/>
                           </a:solidFill>
@@ -4987,7 +4995,7 @@
                       </a:r>
                     </a:p>
                     <a:p>
-                      <a:endParaRPr lang="en-US" sz="1000" cap="none" spc="0">
+                      <a:endParaRPr lang="en-US" sz="1000" cap="none" spc="0" dirty="0">
                         <a:solidFill>
                           <a:schemeClr val="tx1"/>
                         </a:solidFill>
@@ -5026,19 +5034,299 @@
                   </a:ext>
                 </a:extLst>
               </a:tr>
-              <a:tr h="947157">
+              <a:tr h="546088">
                 <a:tc>
                   <a:txBody>
                     <a:bodyPr/>
                     <a:lstStyle/>
                     <a:p>
                       <a:r>
-                        <a:rPr lang="en-US" sz="1000" cap="none" spc="0">
+                        <a:rPr lang="en-US" sz="1000" cap="none" spc="0" dirty="0">
+                          <a:solidFill>
+                            <a:schemeClr val="tx1"/>
+                          </a:solidFill>
+                        </a:rPr>
+                        <a:t>Mixed</a:t>
+                      </a:r>
+                    </a:p>
+                  </a:txBody>
+                  <a:tcPr marL="0" marR="45391" marT="18156" marB="136173">
+                    <a:lnL w="12700" cmpd="sng">
+                      <a:noFill/>
+                      <a:prstDash val="solid"/>
+                    </a:lnL>
+                    <a:lnR w="12700" cmpd="sng">
+                      <a:noFill/>
+                      <a:prstDash val="solid"/>
+                    </a:lnR>
+                    <a:lnT w="6350" cap="flat" cmpd="sng" algn="ctr">
+                      <a:noFill/>
+                      <a:prstDash val="solid"/>
+                    </a:lnT>
+                    <a:lnB w="12700" cmpd="sng">
+                      <a:noFill/>
+                      <a:prstDash val="solid"/>
+                    </a:lnB>
+                    <a:solidFill>
+                      <a:schemeClr val="bg1">
+                        <a:lumMod val="95000"/>
+                      </a:schemeClr>
+                    </a:solidFill>
+                  </a:tcPr>
+                </a:tc>
+                <a:tc>
+                  <a:txBody>
+                    <a:bodyPr/>
+                    <a:lstStyle/>
+                    <a:p>
+                      <a:r>
+                        <a:rPr lang="en-US" sz="1000" cap="none" spc="0" dirty="0">
+                          <a:solidFill>
+                            <a:schemeClr val="tx1"/>
+                          </a:solidFill>
+                        </a:rPr>
+                        <a:t>571</a:t>
+                      </a:r>
+                    </a:p>
+                  </a:txBody>
+                  <a:tcPr marL="0" marR="45391" marT="18156" marB="136173">
+                    <a:lnL w="12700" cmpd="sng">
+                      <a:noFill/>
+                      <a:prstDash val="solid"/>
+                    </a:lnL>
+                    <a:lnR w="12700" cmpd="sng">
+                      <a:noFill/>
+                      <a:prstDash val="solid"/>
+                    </a:lnR>
+                    <a:lnT w="6350" cap="flat" cmpd="sng" algn="ctr">
+                      <a:noFill/>
+                      <a:prstDash val="solid"/>
+                    </a:lnT>
+                    <a:lnB w="12700" cmpd="sng">
+                      <a:noFill/>
+                      <a:prstDash val="solid"/>
+                    </a:lnB>
+                    <a:solidFill>
+                      <a:schemeClr val="bg1">
+                        <a:lumMod val="95000"/>
+                      </a:schemeClr>
+                    </a:solidFill>
+                  </a:tcPr>
+                </a:tc>
+                <a:tc>
+                  <a:txBody>
+                    <a:bodyPr/>
+                    <a:lstStyle/>
+                    <a:p>
+                      <a:r>
+                        <a:rPr lang="en-US" sz="1000" cap="none" spc="0" dirty="0">
+                          <a:solidFill>
+                            <a:schemeClr val="tx1"/>
+                          </a:solidFill>
+                        </a:rPr>
+                        <a:t>807</a:t>
+                      </a:r>
+                    </a:p>
+                  </a:txBody>
+                  <a:tcPr marL="0" marR="45391" marT="18156" marB="136173">
+                    <a:lnL w="12700" cmpd="sng">
+                      <a:noFill/>
+                      <a:prstDash val="solid"/>
+                    </a:lnL>
+                    <a:lnR w="12700" cmpd="sng">
+                      <a:noFill/>
+                      <a:prstDash val="solid"/>
+                    </a:lnR>
+                    <a:lnT w="6350" cap="flat" cmpd="sng" algn="ctr">
+                      <a:noFill/>
+                      <a:prstDash val="solid"/>
+                    </a:lnT>
+                    <a:lnB w="12700" cmpd="sng">
+                      <a:noFill/>
+                      <a:prstDash val="solid"/>
+                    </a:lnB>
+                    <a:solidFill>
+                      <a:schemeClr val="bg1">
+                        <a:lumMod val="95000"/>
+                      </a:schemeClr>
+                    </a:solidFill>
+                  </a:tcPr>
+                </a:tc>
+                <a:tc>
+                  <a:txBody>
+                    <a:bodyPr/>
+                    <a:lstStyle/>
+                    <a:p>
+                      <a:r>
+                        <a:rPr lang="en-US" sz="1000" cap="none" spc="0" dirty="0">
+                          <a:solidFill>
+                            <a:schemeClr val="tx1"/>
+                          </a:solidFill>
+                        </a:rPr>
+                        <a:t>$13783+</a:t>
+                      </a:r>
+                    </a:p>
+                    <a:p>
+                      <a:pPr marL="0" marR="0" lvl="0" indent="0" algn="l" defTabSz="914400" rtl="0" eaLnBrk="1" fontAlgn="auto" latinLnBrk="0" hangingPunct="1">
+                        <a:lnSpc>
+                          <a:spcPct val="100000"/>
+                        </a:lnSpc>
+                        <a:spcBef>
+                          <a:spcPts val="0"/>
+                        </a:spcBef>
+                        <a:spcAft>
+                          <a:spcPts val="0"/>
+                        </a:spcAft>
+                        <a:buClrTx/>
+                        <a:buSzTx/>
+                        <a:buFontTx/>
+                        <a:buNone/>
+                        <a:tabLst/>
+                        <a:defRPr/>
+                      </a:pPr>
+                      <a:r>
+                        <a:rPr lang="en-US" sz="1000" cap="none" spc="0" dirty="0">
+                          <a:solidFill>
+                            <a:schemeClr val="tx1"/>
+                          </a:solidFill>
+                        </a:rPr>
+                        <a:t>C(intangible medium)</a:t>
+                      </a:r>
+                    </a:p>
+                    <a:p>
+                      <a:endParaRPr lang="en-US" sz="1000" cap="none" spc="0" dirty="0">
+                        <a:solidFill>
+                          <a:schemeClr val="tx1"/>
+                        </a:solidFill>
+                      </a:endParaRPr>
+                    </a:p>
+                  </a:txBody>
+                  <a:tcPr marL="0" marR="45391" marT="18156" marB="136173">
+                    <a:lnL w="12700" cmpd="sng">
+                      <a:noFill/>
+                      <a:prstDash val="solid"/>
+                    </a:lnL>
+                    <a:lnR w="12700" cmpd="sng">
+                      <a:noFill/>
+                      <a:prstDash val="solid"/>
+                    </a:lnR>
+                    <a:lnT w="6350" cap="flat" cmpd="sng" algn="ctr">
+                      <a:noFill/>
+                      <a:prstDash val="solid"/>
+                    </a:lnT>
+                    <a:lnB w="12700" cmpd="sng">
+                      <a:noFill/>
+                      <a:prstDash val="solid"/>
+                    </a:lnB>
+                    <a:solidFill>
+                      <a:schemeClr val="bg1">
+                        <a:lumMod val="95000"/>
+                      </a:schemeClr>
+                    </a:solidFill>
+                  </a:tcPr>
+                </a:tc>
+                <a:tc>
+                  <a:txBody>
+                    <a:bodyPr/>
+                    <a:lstStyle/>
+                    <a:p>
+                      <a:r>
+                        <a:rPr lang="en-US" sz="1000" cap="none" spc="0" dirty="0">
+                          <a:solidFill>
+                            <a:schemeClr val="tx1"/>
+                          </a:solidFill>
+                        </a:rPr>
+                        <a:t>$27567+</a:t>
+                      </a:r>
+                    </a:p>
+                    <a:p>
+                      <a:pPr marL="0" marR="0" lvl="0" indent="0" algn="l" defTabSz="914400" rtl="0" eaLnBrk="1" fontAlgn="auto" latinLnBrk="0" hangingPunct="1">
+                        <a:lnSpc>
+                          <a:spcPct val="100000"/>
+                        </a:lnSpc>
+                        <a:spcBef>
+                          <a:spcPts val="0"/>
+                        </a:spcBef>
+                        <a:spcAft>
+                          <a:spcPts val="0"/>
+                        </a:spcAft>
+                        <a:buClrTx/>
+                        <a:buSzTx/>
+                        <a:buFontTx/>
+                        <a:buNone/>
+                        <a:tabLst/>
+                        <a:defRPr/>
+                      </a:pPr>
+                      <a:r>
+                        <a:rPr lang="en-US" sz="1000" cap="none" spc="0" dirty="0">
+                          <a:solidFill>
+                            <a:schemeClr val="tx1"/>
+                          </a:solidFill>
+                        </a:rPr>
+                        <a:t>C(intangible medium)</a:t>
+                      </a:r>
+                    </a:p>
+                    <a:p>
+                      <a:endParaRPr lang="en-US" sz="1000" cap="none" spc="0" dirty="0">
+                        <a:solidFill>
+                          <a:schemeClr val="tx1"/>
+                        </a:solidFill>
+                      </a:endParaRPr>
+                    </a:p>
+                  </a:txBody>
+                  <a:tcPr marL="0" marR="45391" marT="18156" marB="136173">
+                    <a:lnL w="12700" cmpd="sng">
+                      <a:noFill/>
+                      <a:prstDash val="solid"/>
+                    </a:lnL>
+                    <a:lnR w="12700" cmpd="sng">
+                      <a:noFill/>
+                      <a:prstDash val="solid"/>
+                    </a:lnR>
+                    <a:lnT w="6350" cap="flat" cmpd="sng" algn="ctr">
+                      <a:noFill/>
+                      <a:prstDash val="solid"/>
+                    </a:lnT>
+                    <a:lnB w="12700" cmpd="sng">
+                      <a:noFill/>
+                      <a:prstDash val="solid"/>
+                    </a:lnB>
+                    <a:solidFill>
+                      <a:schemeClr val="bg1">
+                        <a:lumMod val="95000"/>
+                      </a:schemeClr>
+                    </a:solidFill>
+                  </a:tcPr>
+                </a:tc>
+                <a:extLst>
+                  <a:ext uri="{0D108BD9-81ED-4DB2-BD59-A6C34878D82A}">
+                    <a16:rowId xmlns:a16="http://schemas.microsoft.com/office/drawing/2014/main" val="3078379153"/>
+                  </a:ext>
+                </a:extLst>
+              </a:tr>
+              <a:tr h="802468">
+                <a:tc>
+                  <a:txBody>
+                    <a:bodyPr/>
+                    <a:lstStyle/>
+                    <a:p>
+                      <a:r>
+                        <a:rPr lang="en-US" sz="1000" cap="none" spc="0" dirty="0">
                           <a:solidFill>
                             <a:schemeClr val="tx1"/>
                           </a:solidFill>
                         </a:rPr>
                         <a:t>Difference</a:t>
+                      </a:r>
+                    </a:p>
+                    <a:p>
+                      <a:r>
+                        <a:rPr lang="en-US" sz="1000" cap="none" spc="0" dirty="0">
+                          <a:solidFill>
+                            <a:schemeClr val="tx1"/>
+                          </a:solidFill>
+                        </a:rPr>
+                        <a:t>(No ML-ML)</a:t>
                       </a:r>
                     </a:p>
                   </a:txBody>
@@ -5068,7 +5356,7 @@
                     <a:lstStyle/>
                     <a:p>
                       <a:r>
-                        <a:rPr lang="en-US" sz="1000" cap="none" spc="0">
+                        <a:rPr lang="en-US" sz="1000" cap="none" spc="0" dirty="0">
                           <a:solidFill>
                             <a:schemeClr val="tx1"/>
                           </a:solidFill>
@@ -5103,7 +5391,7 @@
                     <a:lstStyle/>
                     <a:p>
                       <a:r>
-                        <a:rPr lang="en-US" sz="1000" cap="none" spc="0">
+                        <a:rPr lang="en-US" sz="1000" cap="none" spc="0" dirty="0">
                           <a:solidFill>
                             <a:schemeClr val="tx1"/>
                           </a:solidFill>
@@ -5249,6 +5537,270 @@
                   </a:ext>
                 </a:extLst>
               </a:tr>
+              <a:tr h="802468">
+                <a:tc>
+                  <a:txBody>
+                    <a:bodyPr/>
+                    <a:lstStyle/>
+                    <a:p>
+                      <a:r>
+                        <a:rPr lang="en-US" sz="1000" cap="none" spc="0" dirty="0">
+                          <a:solidFill>
+                            <a:schemeClr val="tx1"/>
+                          </a:solidFill>
+                        </a:rPr>
+                        <a:t>Difference</a:t>
+                      </a:r>
+                    </a:p>
+                    <a:p>
+                      <a:r>
+                        <a:rPr lang="en-US" sz="1000" cap="none" spc="0" dirty="0">
+                          <a:solidFill>
+                            <a:schemeClr val="tx1"/>
+                          </a:solidFill>
+                        </a:rPr>
+                        <a:t>(Mixed-ML)</a:t>
+                      </a:r>
+                    </a:p>
+                    <a:p>
+                      <a:endParaRPr lang="en-US" sz="1000" cap="none" spc="0" dirty="0">
+                        <a:solidFill>
+                          <a:schemeClr val="tx1"/>
+                        </a:solidFill>
+                      </a:endParaRPr>
+                    </a:p>
+                  </a:txBody>
+                  <a:tcPr marL="0" marR="45391" marT="18156" marB="136173">
+                    <a:lnL w="12700" cmpd="sng">
+                      <a:noFill/>
+                      <a:prstDash val="solid"/>
+                    </a:lnL>
+                    <a:lnR w="12700" cmpd="sng">
+                      <a:noFill/>
+                      <a:prstDash val="solid"/>
+                    </a:lnR>
+                    <a:lnT w="12700" cmpd="sng">
+                      <a:noFill/>
+                      <a:prstDash val="solid"/>
+                    </a:lnT>
+                    <a:lnB w="12700" cmpd="sng">
+                      <a:noFill/>
+                      <a:prstDash val="solid"/>
+                    </a:lnB>
+                    <a:noFill/>
+                  </a:tcPr>
+                </a:tc>
+                <a:tc>
+                  <a:txBody>
+                    <a:bodyPr/>
+                    <a:lstStyle/>
+                    <a:p>
+                      <a:r>
+                        <a:rPr lang="en-US" sz="1000" cap="none" spc="0" dirty="0">
+                          <a:solidFill>
+                            <a:schemeClr val="tx1"/>
+                          </a:solidFill>
+                        </a:rPr>
+                        <a:t>119</a:t>
+                      </a:r>
+                    </a:p>
+                  </a:txBody>
+                  <a:tcPr marL="0" marR="45391" marT="18156" marB="136173">
+                    <a:lnL w="12700" cmpd="sng">
+                      <a:noFill/>
+                      <a:prstDash val="solid"/>
+                    </a:lnL>
+                    <a:lnR w="12700" cmpd="sng">
+                      <a:noFill/>
+                      <a:prstDash val="solid"/>
+                    </a:lnR>
+                    <a:lnT w="12700" cmpd="sng">
+                      <a:noFill/>
+                      <a:prstDash val="solid"/>
+                    </a:lnT>
+                    <a:lnB w="12700" cmpd="sng">
+                      <a:noFill/>
+                      <a:prstDash val="solid"/>
+                    </a:lnB>
+                    <a:noFill/>
+                  </a:tcPr>
+                </a:tc>
+                <a:tc>
+                  <a:txBody>
+                    <a:bodyPr/>
+                    <a:lstStyle/>
+                    <a:p>
+                      <a:r>
+                        <a:rPr lang="en-US" sz="1000" cap="none" spc="0" dirty="0">
+                          <a:solidFill>
+                            <a:schemeClr val="tx1"/>
+                          </a:solidFill>
+                        </a:rPr>
+                        <a:t>527</a:t>
+                      </a:r>
+                    </a:p>
+                  </a:txBody>
+                  <a:tcPr marL="0" marR="45391" marT="18156" marB="136173">
+                    <a:lnL w="12700" cmpd="sng">
+                      <a:noFill/>
+                      <a:prstDash val="solid"/>
+                    </a:lnL>
+                    <a:lnR w="12700" cmpd="sng">
+                      <a:noFill/>
+                      <a:prstDash val="solid"/>
+                    </a:lnR>
+                    <a:lnT w="12700" cmpd="sng">
+                      <a:noFill/>
+                      <a:prstDash val="solid"/>
+                    </a:lnT>
+                    <a:lnB w="12700" cmpd="sng">
+                      <a:noFill/>
+                      <a:prstDash val="solid"/>
+                    </a:lnB>
+                    <a:noFill/>
+                  </a:tcPr>
+                </a:tc>
+                <a:tc>
+                  <a:txBody>
+                    <a:bodyPr/>
+                    <a:lstStyle/>
+                    <a:p>
+                      <a:pPr marL="0" marR="0" lvl="0" indent="0" algn="l" defTabSz="914400" rtl="0" eaLnBrk="1" fontAlgn="auto" latinLnBrk="0" hangingPunct="1">
+                        <a:lnSpc>
+                          <a:spcPct val="100000"/>
+                        </a:lnSpc>
+                        <a:spcBef>
+                          <a:spcPts val="0"/>
+                        </a:spcBef>
+                        <a:spcAft>
+                          <a:spcPts val="0"/>
+                        </a:spcAft>
+                        <a:buClrTx/>
+                        <a:buSzTx/>
+                        <a:buFontTx/>
+                        <a:buNone/>
+                        <a:tabLst/>
+                        <a:defRPr/>
+                      </a:pPr>
+                      <a:r>
+                        <a:rPr lang="en-US" sz="1000" cap="none" spc="0" dirty="0">
+                          <a:solidFill>
+                            <a:schemeClr val="tx1"/>
+                          </a:solidFill>
+                        </a:rPr>
+                        <a:t>$6463+(C(intangible medium)-C(intangible low))</a:t>
+                      </a:r>
+                    </a:p>
+                    <a:p>
+                      <a:pPr marL="0" marR="0" lvl="0" indent="0" algn="l" defTabSz="914400" rtl="0" eaLnBrk="1" fontAlgn="auto" latinLnBrk="0" hangingPunct="1">
+                        <a:lnSpc>
+                          <a:spcPct val="100000"/>
+                        </a:lnSpc>
+                        <a:spcBef>
+                          <a:spcPts val="0"/>
+                        </a:spcBef>
+                        <a:spcAft>
+                          <a:spcPts val="0"/>
+                        </a:spcAft>
+                        <a:buClrTx/>
+                        <a:buSzTx/>
+                        <a:buFontTx/>
+                        <a:buNone/>
+                        <a:tabLst/>
+                        <a:defRPr/>
+                      </a:pPr>
+                      <a:endParaRPr lang="en-US" sz="1000" cap="none" spc="0" dirty="0">
+                        <a:solidFill>
+                          <a:schemeClr val="tx1"/>
+                        </a:solidFill>
+                      </a:endParaRPr>
+                    </a:p>
+                  </a:txBody>
+                  <a:tcPr marL="0" marR="45391" marT="18156" marB="136173">
+                    <a:lnL w="12700" cmpd="sng">
+                      <a:noFill/>
+                      <a:prstDash val="solid"/>
+                    </a:lnL>
+                    <a:lnR w="12700" cmpd="sng">
+                      <a:noFill/>
+                      <a:prstDash val="solid"/>
+                    </a:lnR>
+                    <a:lnT w="12700" cmpd="sng">
+                      <a:noFill/>
+                      <a:prstDash val="solid"/>
+                    </a:lnT>
+                    <a:lnB w="12700" cmpd="sng">
+                      <a:noFill/>
+                      <a:prstDash val="solid"/>
+                    </a:lnB>
+                    <a:noFill/>
+                  </a:tcPr>
+                </a:tc>
+                <a:tc>
+                  <a:txBody>
+                    <a:bodyPr/>
+                    <a:lstStyle/>
+                    <a:p>
+                      <a:pPr marL="0" marR="0" lvl="0" indent="0" algn="l" defTabSz="914400" rtl="0" eaLnBrk="1" fontAlgn="auto" latinLnBrk="0" hangingPunct="1">
+                        <a:lnSpc>
+                          <a:spcPct val="100000"/>
+                        </a:lnSpc>
+                        <a:spcBef>
+                          <a:spcPts val="0"/>
+                        </a:spcBef>
+                        <a:spcAft>
+                          <a:spcPts val="0"/>
+                        </a:spcAft>
+                        <a:buClrTx/>
+                        <a:buSzTx/>
+                        <a:buFontTx/>
+                        <a:buNone/>
+                        <a:tabLst/>
+                        <a:defRPr/>
+                      </a:pPr>
+                      <a:r>
+                        <a:rPr lang="en-US" sz="1000" cap="none" spc="0" dirty="0">
+                          <a:solidFill>
+                            <a:schemeClr val="tx1"/>
+                          </a:solidFill>
+                        </a:rPr>
+                        <a:t>$12926+(C(intangible medium)-C(intangible low))</a:t>
+                      </a:r>
+                    </a:p>
+                    <a:p>
+                      <a:endParaRPr lang="en-US" sz="1000" cap="none" spc="0" dirty="0">
+                        <a:solidFill>
+                          <a:schemeClr val="tx1"/>
+                        </a:solidFill>
+                      </a:endParaRPr>
+                    </a:p>
+                  </a:txBody>
+                  <a:tcPr marL="0" marR="45391" marT="18156" marB="136173">
+                    <a:lnL w="12700" cmpd="sng">
+                      <a:noFill/>
+                      <a:prstDash val="solid"/>
+                    </a:lnL>
+                    <a:lnR w="12700" cmpd="sng">
+                      <a:noFill/>
+                      <a:prstDash val="solid"/>
+                    </a:lnR>
+                    <a:lnT w="12700" cmpd="sng">
+                      <a:noFill/>
+                      <a:prstDash val="solid"/>
+                    </a:lnT>
+                    <a:lnB w="12700" cmpd="sng">
+                      <a:noFill/>
+                      <a:prstDash val="solid"/>
+                    </a:lnB>
+                    <a:noFill/>
+                  </a:tcPr>
+                </a:tc>
+                <a:extLst>
+                  <a:ext uri="{0D108BD9-81ED-4DB2-BD59-A6C34878D82A}">
+                    <a16:rowId xmlns:a16="http://schemas.microsoft.com/office/drawing/2014/main" val="2649515448"/>
+                  </a:ext>
+                </a:extLst>
+              </a:tr>
             </a:tbl>
           </a:graphicData>
         </a:graphic>
@@ -5330,13 +5882,13 @@
         <p:spPr/>
         <p:txBody>
           <a:bodyPr>
-            <a:normAutofit fontScale="92500" lnSpcReduction="10000"/>
+            <a:normAutofit fontScale="92500" lnSpcReduction="20000"/>
           </a:bodyPr>
           <a:lstStyle/>
           <a:p>
             <a:r>
               <a:rPr lang="en-US" dirty="0"/>
-              <a:t>Adopt the ML strategy if long-term customer value and intangible costs are a significant concern and campaign resources are limited.  </a:t>
+              <a:t>Adopt the ML strategy if long-term customer value and intangible costs are a significant concern and campaign resources are limited. This will allow getting 63% of all potential yeses at low cost.</a:t>
             </a:r>
           </a:p>
           <a:p>
@@ -5356,13 +5908,13 @@
           <a:p>
             <a:r>
               <a:rPr lang="en-US" dirty="0"/>
-              <a:t>Adopt a mixed strategy of first calling the customers identified by the ML model, followed by the ones not identified if intangible costs and campaign resources are moderate</a:t>
+              <a:t>Adopt a mixed strategy of contacting clients for which the model predicts their probability of saying a yes as at least 30% if intangible costs and campaign resources are moderate. This will allow getting 80% of all potential yeses at moderate cost.</a:t>
             </a:r>
           </a:p>
           <a:p>
             <a:r>
               <a:rPr lang="en-US" dirty="0"/>
-              <a:t>Adopt a strategy of contacting all customers if have large campaign resources, are less concerned with intangible costs, and the cost of missing some of the yeses is particularly high</a:t>
+              <a:t>Adopt a strategy of contacting all customers if have large campaign resources, are less concerned with intangible costs, and the cost of missing some of the yeses is particularly high. This will allow getting 100% of all potential yeses at higher cost.</a:t>
             </a:r>
           </a:p>
           <a:p>
@@ -5447,7 +5999,7 @@
         <p:spPr/>
         <p:txBody>
           <a:bodyPr>
-            <a:normAutofit fontScale="92500" lnSpcReduction="20000"/>
+            <a:normAutofit fontScale="85000" lnSpcReduction="20000"/>
           </a:bodyPr>
           <a:lstStyle/>
           <a:p>
@@ -5465,7 +6017,7 @@
           <a:p>
             <a:r>
               <a:rPr lang="en-US" dirty="0"/>
-              <a:t>What other data can be obtained? </a:t>
+              <a:t>What other data can be obtained to allow us to build a better model? </a:t>
             </a:r>
           </a:p>
           <a:p>
@@ -5483,14 +6035,17 @@
             </a:r>
           </a:p>
           <a:p>
+            <a:r>
+              <a:rPr lang="en-US" dirty="0"/>
+              <a:t>AB Testing with profit per person metric with and without ML model. Which strategy works best given the bank’s profitability and long-term customer value metrics?</a:t>
+            </a:r>
+          </a:p>
+          <a:p>
             <a:pPr lvl="1"/>
             <a:r>
               <a:rPr lang="en-US" dirty="0"/>
-              <a:t>Convert ROC curve to business metrics to provide flexible recommendations to decision makers</a:t>
-            </a:r>
-          </a:p>
-          <a:p>
-            <a:endParaRPr lang="en-US" dirty="0"/>
+              <a:t>Monitor for model drift</a:t>
+            </a:r>
           </a:p>
         </p:txBody>
       </p:sp>
@@ -7890,8 +8445,8 @@
         </p:blipFill>
         <p:spPr>
           <a:xfrm>
-            <a:off x="5651048" y="3474816"/>
-            <a:ext cx="4579474" cy="2484365"/>
+            <a:off x="5018314" y="3280889"/>
+            <a:ext cx="5971709" cy="3239653"/>
           </a:xfrm>
           <a:prstGeom prst="rect">
             <a:avLst/>

</xml_diff>

<commit_message>
include outline in all documents
</commit_message>
<xml_diff>
--- a/BankMarketing.pptx
+++ b/BankMarketing.pptx
@@ -27,15 +27,16 @@
     <p:sldId id="272" r:id="rId21"/>
     <p:sldId id="274" r:id="rId22"/>
     <p:sldId id="277" r:id="rId23"/>
-    <p:sldId id="289" r:id="rId24"/>
-    <p:sldId id="279" r:id="rId25"/>
-    <p:sldId id="276" r:id="rId26"/>
-    <p:sldId id="269" r:id="rId27"/>
-    <p:sldId id="275" r:id="rId28"/>
-    <p:sldId id="288" r:id="rId29"/>
-    <p:sldId id="284" r:id="rId30"/>
-    <p:sldId id="283" r:id="rId31"/>
-    <p:sldId id="264" r:id="rId32"/>
+    <p:sldId id="290" r:id="rId24"/>
+    <p:sldId id="289" r:id="rId25"/>
+    <p:sldId id="279" r:id="rId26"/>
+    <p:sldId id="276" r:id="rId27"/>
+    <p:sldId id="269" r:id="rId28"/>
+    <p:sldId id="275" r:id="rId29"/>
+    <p:sldId id="288" r:id="rId30"/>
+    <p:sldId id="284" r:id="rId31"/>
+    <p:sldId id="283" r:id="rId32"/>
+    <p:sldId id="264" r:id="rId33"/>
   </p:sldIdLst>
   <p:sldSz cx="12192000" cy="6858000"/>
   <p:notesSz cx="6858000" cy="9144000"/>
@@ -5968,7 +5969,12 @@
             <p:ph type="title"/>
           </p:nvPr>
         </p:nvSpPr>
-        <p:spPr/>
+        <p:spPr>
+          <a:xfrm>
+            <a:off x="1643743" y="964692"/>
+            <a:ext cx="8948057" cy="1188720"/>
+          </a:xfrm>
+        </p:spPr>
         <p:txBody>
           <a:bodyPr/>
           <a:lstStyle/>
@@ -5996,7 +6002,12 @@
             <p:ph idx="1"/>
           </p:nvPr>
         </p:nvSpPr>
-        <p:spPr/>
+        <p:spPr>
+          <a:xfrm>
+            <a:off x="1643743" y="2362200"/>
+            <a:ext cx="8948057" cy="3531108"/>
+          </a:xfrm>
+        </p:spPr>
         <p:txBody>
           <a:bodyPr>
             <a:normAutofit fontScale="85000" lnSpcReduction="20000"/>
@@ -6011,7 +6022,7 @@
           <a:p>
             <a:r>
               <a:rPr lang="en-US" dirty="0"/>
-              <a:t>Deduce the dates from Euribor 3-month rate and perform separate analyses for pre- and post-financial crisis</a:t>
+              <a:t>Having the dates from Euribor 3-month rate would allow one to perform separate analyses for pre- and post-financial crisis or get a more accurate overall model.  Also, could build more reliable validation and test sets (Euribor 3m rates alone cannot be used to reliably deduce dates).</a:t>
             </a:r>
           </a:p>
           <a:p>
@@ -6037,7 +6048,14 @@
           <a:p>
             <a:r>
               <a:rPr lang="en-US" dirty="0"/>
-              <a:t>AB Testing with profit per person metric with and without ML model. Which strategy works best given the bank’s profitability and long-term customer value metrics?</a:t>
+              <a:t>Use AB Testing with profit per person metric to compare model performance in real life. </a:t>
+            </a:r>
+          </a:p>
+          <a:p>
+            <a:pPr lvl="1"/>
+            <a:r>
+              <a:rPr lang="en-US" dirty="0"/>
+              <a:t>Which strategy works best given the bank’s profitability and long-term customer value metrics?</a:t>
             </a:r>
           </a:p>
           <a:p>
@@ -8597,6 +8615,135 @@
 <file path=ppt/slides/slide23.xml><?xml version="1.0" encoding="utf-8"?>
 <p:sld xmlns:a="http://schemas.openxmlformats.org/drawingml/2006/main" xmlns:r="http://schemas.openxmlformats.org/officeDocument/2006/relationships" xmlns:p="http://schemas.openxmlformats.org/presentationml/2006/main">
   <p:cSld>
+    <p:spTree>
+      <p:nvGrpSpPr>
+        <p:cNvPr id="1" name=""/>
+        <p:cNvGrpSpPr/>
+        <p:nvPr/>
+      </p:nvGrpSpPr>
+      <p:grpSpPr>
+        <a:xfrm>
+          <a:off x="0" y="0"/>
+          <a:ext cx="0" cy="0"/>
+          <a:chOff x="0" y="0"/>
+          <a:chExt cx="0" cy="0"/>
+        </a:xfrm>
+      </p:grpSpPr>
+      <p:sp>
+        <p:nvSpPr>
+          <p:cNvPr id="2" name="Title 1">
+            <a:extLst>
+              <a:ext uri="{FF2B5EF4-FFF2-40B4-BE49-F238E27FC236}">
+                <a16:creationId xmlns:a16="http://schemas.microsoft.com/office/drawing/2014/main" id="{DCFA5601-3F5B-C55F-5667-5B0B71DC70A6}"/>
+              </a:ext>
+            </a:extLst>
+          </p:cNvPr>
+          <p:cNvSpPr>
+            <a:spLocks noGrp="1"/>
+          </p:cNvSpPr>
+          <p:nvPr>
+            <p:ph type="title"/>
+          </p:nvPr>
+        </p:nvSpPr>
+        <p:spPr/>
+        <p:txBody>
+          <a:bodyPr/>
+          <a:lstStyle/>
+          <a:p>
+            <a:r>
+              <a:rPr lang="en-US" dirty="0"/>
+              <a:t>Modeling approach</a:t>
+            </a:r>
+          </a:p>
+        </p:txBody>
+      </p:sp>
+      <p:sp>
+        <p:nvSpPr>
+          <p:cNvPr id="3" name="Content Placeholder 2">
+            <a:extLst>
+              <a:ext uri="{FF2B5EF4-FFF2-40B4-BE49-F238E27FC236}">
+                <a16:creationId xmlns:a16="http://schemas.microsoft.com/office/drawing/2014/main" id="{F91066E7-AF7E-0FE6-2C0B-B5A311570FDD}"/>
+              </a:ext>
+            </a:extLst>
+          </p:cNvPr>
+          <p:cNvSpPr>
+            <a:spLocks noGrp="1"/>
+          </p:cNvSpPr>
+          <p:nvPr>
+            <p:ph idx="1"/>
+          </p:nvPr>
+        </p:nvSpPr>
+        <p:spPr/>
+        <p:txBody>
+          <a:bodyPr>
+            <a:normAutofit/>
+          </a:bodyPr>
+          <a:lstStyle/>
+          <a:p>
+            <a:pPr marL="0" indent="0">
+              <a:buNone/>
+            </a:pPr>
+            <a:r>
+              <a:rPr lang="en-US" dirty="0"/>
+              <a:t>Outline: </a:t>
+            </a:r>
+          </a:p>
+          <a:p>
+            <a:r>
+              <a:rPr lang="en-US" dirty="0"/>
+              <a:t>1. Do some preliminary visualizations (already checked that there are no </a:t>
+            </a:r>
+            <a:r>
+              <a:rPr lang="en-US" dirty="0" err="1"/>
+              <a:t>na’s</a:t>
+            </a:r>
+            <a:r>
+              <a:rPr lang="en-US" dirty="0"/>
+              <a:t>)</a:t>
+            </a:r>
+          </a:p>
+          <a:p>
+            <a:r>
+              <a:rPr lang="en-US" dirty="0"/>
+              <a:t>2. Split into training, validation, and test sets</a:t>
+            </a:r>
+          </a:p>
+          <a:p>
+            <a:r>
+              <a:rPr lang="en-US" dirty="0"/>
+              <a:t>3. Fit a random forest, which performed better than gradient boosting</a:t>
+            </a:r>
+          </a:p>
+          <a:p>
+            <a:r>
+              <a:rPr lang="en-US" dirty="0"/>
+              <a:t>4. Do visualizations for the features identified as important by the random forest</a:t>
+            </a:r>
+          </a:p>
+          <a:p>
+            <a:r>
+              <a:rPr lang="en-US" dirty="0"/>
+              <a:t>5. Present the results</a:t>
+            </a:r>
+          </a:p>
+        </p:txBody>
+      </p:sp>
+    </p:spTree>
+    <p:extLst>
+      <p:ext uri="{BB962C8B-B14F-4D97-AF65-F5344CB8AC3E}">
+        <p14:creationId xmlns:p14="http://schemas.microsoft.com/office/powerpoint/2010/main" val="3959928360"/>
+      </p:ext>
+    </p:extLst>
+  </p:cSld>
+  <p:clrMapOvr>
+    <a:masterClrMapping/>
+  </p:clrMapOvr>
+</p:sld>
+</file>
+
+<file path=ppt/slides/slide24.xml><?xml version="1.0" encoding="utf-8"?>
+<p:sld xmlns:a="http://schemas.openxmlformats.org/drawingml/2006/main" xmlns:r="http://schemas.openxmlformats.org/officeDocument/2006/relationships" xmlns:p="http://schemas.openxmlformats.org/presentationml/2006/main">
+  <p:cSld>
     <p:bg>
       <p:bgPr>
         <a:solidFill>
@@ -8766,7 +8913,7 @@
 </p:sld>
 </file>
 
-<file path=ppt/slides/slide24.xml><?xml version="1.0" encoding="utf-8"?>
+<file path=ppt/slides/slide25.xml><?xml version="1.0" encoding="utf-8"?>
 <p:sld xmlns:a="http://schemas.openxmlformats.org/drawingml/2006/main" xmlns:r="http://schemas.openxmlformats.org/officeDocument/2006/relationships" xmlns:p="http://schemas.openxmlformats.org/presentationml/2006/main">
   <p:cSld>
     <p:spTree>
@@ -8847,178 +8994,6 @@
     <p:extLst>
       <p:ext uri="{BB962C8B-B14F-4D97-AF65-F5344CB8AC3E}">
         <p14:creationId xmlns:p14="http://schemas.microsoft.com/office/powerpoint/2010/main" val="787895217"/>
-      </p:ext>
-    </p:extLst>
-  </p:cSld>
-  <p:clrMapOvr>
-    <a:masterClrMapping/>
-  </p:clrMapOvr>
-</p:sld>
-</file>
-
-<file path=ppt/slides/slide25.xml><?xml version="1.0" encoding="utf-8"?>
-<p:sld xmlns:a="http://schemas.openxmlformats.org/drawingml/2006/main" xmlns:r="http://schemas.openxmlformats.org/officeDocument/2006/relationships" xmlns:p="http://schemas.openxmlformats.org/presentationml/2006/main">
-  <p:cSld>
-    <p:bg>
-      <p:bgPr>
-        <a:solidFill>
-          <a:schemeClr val="accent2"/>
-        </a:solidFill>
-        <a:effectLst/>
-      </p:bgPr>
-    </p:bg>
-    <p:spTree>
-      <p:nvGrpSpPr>
-        <p:cNvPr id="1" name=""/>
-        <p:cNvGrpSpPr/>
-        <p:nvPr/>
-      </p:nvGrpSpPr>
-      <p:grpSpPr>
-        <a:xfrm>
-          <a:off x="0" y="0"/>
-          <a:ext cx="0" cy="0"/>
-          <a:chOff x="0" y="0"/>
-          <a:chExt cx="0" cy="0"/>
-        </a:xfrm>
-      </p:grpSpPr>
-      <p:sp>
-        <p:nvSpPr>
-          <p:cNvPr id="18" name="Rectangle 17">
-            <a:extLst>
-              <a:ext uri="{FF2B5EF4-FFF2-40B4-BE49-F238E27FC236}">
-                <a16:creationId xmlns:a16="http://schemas.microsoft.com/office/drawing/2014/main" id="{C3A694C2-50DA-401D-9E8A-3621EBF0C75C}"/>
-              </a:ext>
-              <a:ext uri="{C183D7F6-B498-43B3-948B-1728B52AA6E4}">
-                <adec:decorative xmlns:adec="http://schemas.microsoft.com/office/drawing/2017/decorative" val="1"/>
-              </a:ext>
-            </a:extLst>
-          </p:cNvPr>
-          <p:cNvSpPr>
-            <a:spLocks noGrp="1" noRot="1" noChangeAspect="1" noMove="1" noResize="1" noEditPoints="1" noAdjustHandles="1" noChangeArrowheads="1" noChangeShapeType="1" noTextEdit="1"/>
-          </p:cNvSpPr>
-          <p:nvPr>
-            <p:extLst>
-              <p:ext uri="{386F3935-93C4-4BCD-93E2-E3B085C9AB24}">
-                <p16:designElem xmlns:p16="http://schemas.microsoft.com/office/powerpoint/2015/main" val="1"/>
-              </p:ext>
-            </p:extLst>
-          </p:nvPr>
-        </p:nvSpPr>
-        <p:spPr>
-          <a:xfrm>
-            <a:off x="0" y="-2"/>
-            <a:ext cx="12192000" cy="4918511"/>
-          </a:xfrm>
-          <a:prstGeom prst="rect">
-            <a:avLst/>
-          </a:prstGeom>
-          <a:solidFill>
-            <a:srgbClr val="FFFFFF"/>
-          </a:solidFill>
-          <a:ln>
-            <a:noFill/>
-          </a:ln>
-        </p:spPr>
-        <p:style>
-          <a:lnRef idx="2">
-            <a:schemeClr val="accent1">
-              <a:shade val="50000"/>
-            </a:schemeClr>
-          </a:lnRef>
-          <a:fillRef idx="1">
-            <a:schemeClr val="accent1"/>
-          </a:fillRef>
-          <a:effectRef idx="0">
-            <a:schemeClr val="accent1"/>
-          </a:effectRef>
-          <a:fontRef idx="minor">
-            <a:schemeClr val="lt1"/>
-          </a:fontRef>
-        </p:style>
-        <p:txBody>
-          <a:bodyPr rtlCol="0" anchor="ctr"/>
-          <a:lstStyle/>
-          <a:p>
-            <a:pPr algn="ctr"/>
-            <a:endParaRPr lang="en-US"/>
-          </a:p>
-        </p:txBody>
-      </p:sp>
-      <p:sp>
-        <p:nvSpPr>
-          <p:cNvPr id="2" name="Title 1">
-            <a:extLst>
-              <a:ext uri="{FF2B5EF4-FFF2-40B4-BE49-F238E27FC236}">
-                <a16:creationId xmlns:a16="http://schemas.microsoft.com/office/drawing/2014/main" id="{20C7406C-EBC6-6D9D-6D65-A9A05A5F7E29}"/>
-              </a:ext>
-            </a:extLst>
-          </p:cNvPr>
-          <p:cNvSpPr>
-            <a:spLocks noGrp="1"/>
-          </p:cNvSpPr>
-          <p:nvPr>
-            <p:ph type="title"/>
-          </p:nvPr>
-        </p:nvSpPr>
-        <p:spPr>
-          <a:xfrm>
-            <a:off x="1600200" y="4269282"/>
-            <a:ext cx="8991600" cy="1264762"/>
-          </a:xfrm>
-        </p:spPr>
-        <p:txBody>
-          <a:bodyPr vert="horz" lIns="274320" tIns="182880" rIns="274320" bIns="182880" rtlCol="0" anchor="ctr" anchorCtr="1">
-            <a:normAutofit/>
-          </a:bodyPr>
-          <a:lstStyle/>
-          <a:p>
-            <a:r>
-              <a:rPr lang="en-US" sz="3200" dirty="0">
-                <a:solidFill>
-                  <a:srgbClr val="262626"/>
-                </a:solidFill>
-              </a:rPr>
-              <a:t>Days since last contact and deposit</a:t>
-            </a:r>
-          </a:p>
-        </p:txBody>
-      </p:sp>
-      <p:pic>
-        <p:nvPicPr>
-          <p:cNvPr id="4" name="Content Placeholder 3">
-            <a:extLst>
-              <a:ext uri="{FF2B5EF4-FFF2-40B4-BE49-F238E27FC236}">
-                <a16:creationId xmlns:a16="http://schemas.microsoft.com/office/drawing/2014/main" id="{8A966576-EE7C-50C2-1703-C342B5531A39}"/>
-              </a:ext>
-            </a:extLst>
-          </p:cNvPr>
-          <p:cNvPicPr>
-            <a:picLocks noGrp="1" noChangeAspect="1"/>
-          </p:cNvPicPr>
-          <p:nvPr>
-            <p:ph idx="1"/>
-          </p:nvPr>
-        </p:nvPicPr>
-        <p:blipFill>
-          <a:blip r:embed="rId2"/>
-          <a:stretch>
-            <a:fillRect/>
-          </a:stretch>
-        </p:blipFill>
-        <p:spPr>
-          <a:xfrm>
-            <a:off x="2583970" y="640078"/>
-            <a:ext cx="7024059" cy="3301307"/>
-          </a:xfrm>
-          <a:prstGeom prst="rect">
-            <a:avLst/>
-          </a:prstGeom>
-        </p:spPr>
-      </p:pic>
-    </p:spTree>
-    <p:extLst>
-      <p:ext uri="{BB962C8B-B14F-4D97-AF65-F5344CB8AC3E}">
-        <p14:creationId xmlns:p14="http://schemas.microsoft.com/office/powerpoint/2010/main" val="3429850141"/>
       </p:ext>
     </p:extLst>
   </p:cSld>
@@ -9055,7 +9030,7 @@
       </p:grpSpPr>
       <p:sp>
         <p:nvSpPr>
-          <p:cNvPr id="25" name="Rectangle 24">
+          <p:cNvPr id="18" name="Rectangle 17">
             <a:extLst>
               <a:ext uri="{FF2B5EF4-FFF2-40B4-BE49-F238E27FC236}">
                 <a16:creationId xmlns:a16="http://schemas.microsoft.com/office/drawing/2014/main" id="{C3A694C2-50DA-401D-9E8A-3621EBF0C75C}"/>
@@ -9121,7 +9096,7 @@
           <p:cNvPr id="2" name="Title 1">
             <a:extLst>
               <a:ext uri="{FF2B5EF4-FFF2-40B4-BE49-F238E27FC236}">
-                <a16:creationId xmlns:a16="http://schemas.microsoft.com/office/drawing/2014/main" id="{824A567C-7B3A-66E4-CFEB-9CCF8186CA90}"/>
+                <a16:creationId xmlns:a16="http://schemas.microsoft.com/office/drawing/2014/main" id="{20C7406C-EBC6-6D9D-6D65-A9A05A5F7E29}"/>
               </a:ext>
             </a:extLst>
           </p:cNvPr>
@@ -9150,17 +9125,17 @@
                   <a:srgbClr val="262626"/>
                 </a:solidFill>
               </a:rPr>
-              <a:t>Number of contacts vs deposits</a:t>
+              <a:t>Days since last contact and deposit</a:t>
             </a:r>
           </a:p>
         </p:txBody>
       </p:sp>
       <p:pic>
         <p:nvPicPr>
-          <p:cNvPr id="3" name="Content Placeholder 2">
+          <p:cNvPr id="4" name="Content Placeholder 3">
             <a:extLst>
               <a:ext uri="{FF2B5EF4-FFF2-40B4-BE49-F238E27FC236}">
-                <a16:creationId xmlns:a16="http://schemas.microsoft.com/office/drawing/2014/main" id="{3899FC30-D07C-4684-6E68-54F251A3F471}"/>
+                <a16:creationId xmlns:a16="http://schemas.microsoft.com/office/drawing/2014/main" id="{8A966576-EE7C-50C2-1703-C342B5531A39}"/>
               </a:ext>
             </a:extLst>
           </p:cNvPr>
@@ -9179,8 +9154,8 @@
         </p:blipFill>
         <p:spPr>
           <a:xfrm>
-            <a:off x="2921667" y="640078"/>
-            <a:ext cx="6348666" cy="3301307"/>
+            <a:off x="2583970" y="640078"/>
+            <a:ext cx="7024059" cy="3301307"/>
           </a:xfrm>
           <a:prstGeom prst="rect">
             <a:avLst/>
@@ -9190,7 +9165,7 @@
     </p:spTree>
     <p:extLst>
       <p:ext uri="{BB962C8B-B14F-4D97-AF65-F5344CB8AC3E}">
-        <p14:creationId xmlns:p14="http://schemas.microsoft.com/office/powerpoint/2010/main" val="2788838927"/>
+        <p14:creationId xmlns:p14="http://schemas.microsoft.com/office/powerpoint/2010/main" val="3429850141"/>
       </p:ext>
     </p:extLst>
   </p:cSld>
@@ -9227,7 +9202,7 @@
       </p:grpSpPr>
       <p:sp>
         <p:nvSpPr>
-          <p:cNvPr id="18" name="Rectangle 17">
+          <p:cNvPr id="25" name="Rectangle 24">
             <a:extLst>
               <a:ext uri="{FF2B5EF4-FFF2-40B4-BE49-F238E27FC236}">
                 <a16:creationId xmlns:a16="http://schemas.microsoft.com/office/drawing/2014/main" id="{C3A694C2-50DA-401D-9E8A-3621EBF0C75C}"/>
@@ -9293,7 +9268,7 @@
           <p:cNvPr id="2" name="Title 1">
             <a:extLst>
               <a:ext uri="{FF2B5EF4-FFF2-40B4-BE49-F238E27FC236}">
-                <a16:creationId xmlns:a16="http://schemas.microsoft.com/office/drawing/2014/main" id="{E1809979-7069-1CAC-61FD-71B29F26F407}"/>
+                <a16:creationId xmlns:a16="http://schemas.microsoft.com/office/drawing/2014/main" id="{824A567C-7B3A-66E4-CFEB-9CCF8186CA90}"/>
               </a:ext>
             </a:extLst>
           </p:cNvPr>
@@ -9317,22 +9292,22 @@
           <a:lstStyle/>
           <a:p>
             <a:r>
-              <a:rPr lang="en-US" sz="3200">
+              <a:rPr lang="en-US" sz="3200" dirty="0">
                 <a:solidFill>
                   <a:srgbClr val="262626"/>
                 </a:solidFill>
               </a:rPr>
-              <a:t>Number of employees vs deposits</a:t>
+              <a:t>Number of contacts vs deposits</a:t>
             </a:r>
           </a:p>
         </p:txBody>
       </p:sp>
       <p:pic>
         <p:nvPicPr>
-          <p:cNvPr id="4" name="Content Placeholder 3">
+          <p:cNvPr id="3" name="Content Placeholder 2">
             <a:extLst>
               <a:ext uri="{FF2B5EF4-FFF2-40B4-BE49-F238E27FC236}">
-                <a16:creationId xmlns:a16="http://schemas.microsoft.com/office/drawing/2014/main" id="{4EDCDF1C-2E7E-C5BF-7824-755BAA009B87}"/>
+                <a16:creationId xmlns:a16="http://schemas.microsoft.com/office/drawing/2014/main" id="{3899FC30-D07C-4684-6E68-54F251A3F471}"/>
               </a:ext>
             </a:extLst>
           </p:cNvPr>
@@ -9351,8 +9326,8 @@
         </p:blipFill>
         <p:spPr>
           <a:xfrm>
-            <a:off x="2527019" y="640078"/>
-            <a:ext cx="7137962" cy="3301307"/>
+            <a:off x="2921667" y="640078"/>
+            <a:ext cx="6348666" cy="3301307"/>
           </a:xfrm>
           <a:prstGeom prst="rect">
             <a:avLst/>
@@ -9362,7 +9337,7 @@
     </p:spTree>
     <p:extLst>
       <p:ext uri="{BB962C8B-B14F-4D97-AF65-F5344CB8AC3E}">
-        <p14:creationId xmlns:p14="http://schemas.microsoft.com/office/powerpoint/2010/main" val="485437797"/>
+        <p14:creationId xmlns:p14="http://schemas.microsoft.com/office/powerpoint/2010/main" val="2788838927"/>
       </p:ext>
     </p:extLst>
   </p:cSld>
@@ -9399,7 +9374,7 @@
       </p:grpSpPr>
       <p:sp>
         <p:nvSpPr>
-          <p:cNvPr id="13" name="Rectangle 8">
+          <p:cNvPr id="18" name="Rectangle 17">
             <a:extLst>
               <a:ext uri="{FF2B5EF4-FFF2-40B4-BE49-F238E27FC236}">
                 <a16:creationId xmlns:a16="http://schemas.microsoft.com/office/drawing/2014/main" id="{C3A694C2-50DA-401D-9E8A-3621EBF0C75C}"/>
@@ -9465,6 +9440,178 @@
           <p:cNvPr id="2" name="Title 1">
             <a:extLst>
               <a:ext uri="{FF2B5EF4-FFF2-40B4-BE49-F238E27FC236}">
+                <a16:creationId xmlns:a16="http://schemas.microsoft.com/office/drawing/2014/main" id="{E1809979-7069-1CAC-61FD-71B29F26F407}"/>
+              </a:ext>
+            </a:extLst>
+          </p:cNvPr>
+          <p:cNvSpPr>
+            <a:spLocks noGrp="1"/>
+          </p:cNvSpPr>
+          <p:nvPr>
+            <p:ph type="title"/>
+          </p:nvPr>
+        </p:nvSpPr>
+        <p:spPr>
+          <a:xfrm>
+            <a:off x="1600200" y="4269282"/>
+            <a:ext cx="8991600" cy="1264762"/>
+          </a:xfrm>
+        </p:spPr>
+        <p:txBody>
+          <a:bodyPr vert="horz" lIns="274320" tIns="182880" rIns="274320" bIns="182880" rtlCol="0" anchor="ctr" anchorCtr="1">
+            <a:normAutofit/>
+          </a:bodyPr>
+          <a:lstStyle/>
+          <a:p>
+            <a:r>
+              <a:rPr lang="en-US" sz="3200">
+                <a:solidFill>
+                  <a:srgbClr val="262626"/>
+                </a:solidFill>
+              </a:rPr>
+              <a:t>Number of employees vs deposits</a:t>
+            </a:r>
+          </a:p>
+        </p:txBody>
+      </p:sp>
+      <p:pic>
+        <p:nvPicPr>
+          <p:cNvPr id="4" name="Content Placeholder 3">
+            <a:extLst>
+              <a:ext uri="{FF2B5EF4-FFF2-40B4-BE49-F238E27FC236}">
+                <a16:creationId xmlns:a16="http://schemas.microsoft.com/office/drawing/2014/main" id="{4EDCDF1C-2E7E-C5BF-7824-755BAA009B87}"/>
+              </a:ext>
+            </a:extLst>
+          </p:cNvPr>
+          <p:cNvPicPr>
+            <a:picLocks noGrp="1" noChangeAspect="1"/>
+          </p:cNvPicPr>
+          <p:nvPr>
+            <p:ph idx="1"/>
+          </p:nvPr>
+        </p:nvPicPr>
+        <p:blipFill>
+          <a:blip r:embed="rId2"/>
+          <a:stretch>
+            <a:fillRect/>
+          </a:stretch>
+        </p:blipFill>
+        <p:spPr>
+          <a:xfrm>
+            <a:off x="2527019" y="640078"/>
+            <a:ext cx="7137962" cy="3301307"/>
+          </a:xfrm>
+          <a:prstGeom prst="rect">
+            <a:avLst/>
+          </a:prstGeom>
+        </p:spPr>
+      </p:pic>
+    </p:spTree>
+    <p:extLst>
+      <p:ext uri="{BB962C8B-B14F-4D97-AF65-F5344CB8AC3E}">
+        <p14:creationId xmlns:p14="http://schemas.microsoft.com/office/powerpoint/2010/main" val="485437797"/>
+      </p:ext>
+    </p:extLst>
+  </p:cSld>
+  <p:clrMapOvr>
+    <a:masterClrMapping/>
+  </p:clrMapOvr>
+</p:sld>
+</file>
+
+<file path=ppt/slides/slide29.xml><?xml version="1.0" encoding="utf-8"?>
+<p:sld xmlns:a="http://schemas.openxmlformats.org/drawingml/2006/main" xmlns:r="http://schemas.openxmlformats.org/officeDocument/2006/relationships" xmlns:p="http://schemas.openxmlformats.org/presentationml/2006/main">
+  <p:cSld>
+    <p:bg>
+      <p:bgPr>
+        <a:solidFill>
+          <a:schemeClr val="accent2"/>
+        </a:solidFill>
+        <a:effectLst/>
+      </p:bgPr>
+    </p:bg>
+    <p:spTree>
+      <p:nvGrpSpPr>
+        <p:cNvPr id="1" name=""/>
+        <p:cNvGrpSpPr/>
+        <p:nvPr/>
+      </p:nvGrpSpPr>
+      <p:grpSpPr>
+        <a:xfrm>
+          <a:off x="0" y="0"/>
+          <a:ext cx="0" cy="0"/>
+          <a:chOff x="0" y="0"/>
+          <a:chExt cx="0" cy="0"/>
+        </a:xfrm>
+      </p:grpSpPr>
+      <p:sp>
+        <p:nvSpPr>
+          <p:cNvPr id="13" name="Rectangle 8">
+            <a:extLst>
+              <a:ext uri="{FF2B5EF4-FFF2-40B4-BE49-F238E27FC236}">
+                <a16:creationId xmlns:a16="http://schemas.microsoft.com/office/drawing/2014/main" id="{C3A694C2-50DA-401D-9E8A-3621EBF0C75C}"/>
+              </a:ext>
+              <a:ext uri="{C183D7F6-B498-43B3-948B-1728B52AA6E4}">
+                <adec:decorative xmlns:adec="http://schemas.microsoft.com/office/drawing/2017/decorative" val="1"/>
+              </a:ext>
+            </a:extLst>
+          </p:cNvPr>
+          <p:cNvSpPr>
+            <a:spLocks noGrp="1" noRot="1" noChangeAspect="1" noMove="1" noResize="1" noEditPoints="1" noAdjustHandles="1" noChangeArrowheads="1" noChangeShapeType="1" noTextEdit="1"/>
+          </p:cNvSpPr>
+          <p:nvPr>
+            <p:extLst>
+              <p:ext uri="{386F3935-93C4-4BCD-93E2-E3B085C9AB24}">
+                <p16:designElem xmlns:p16="http://schemas.microsoft.com/office/powerpoint/2015/main" val="1"/>
+              </p:ext>
+            </p:extLst>
+          </p:nvPr>
+        </p:nvSpPr>
+        <p:spPr>
+          <a:xfrm>
+            <a:off x="0" y="-2"/>
+            <a:ext cx="12192000" cy="4918511"/>
+          </a:xfrm>
+          <a:prstGeom prst="rect">
+            <a:avLst/>
+          </a:prstGeom>
+          <a:solidFill>
+            <a:srgbClr val="FFFFFF"/>
+          </a:solidFill>
+          <a:ln>
+            <a:noFill/>
+          </a:ln>
+        </p:spPr>
+        <p:style>
+          <a:lnRef idx="2">
+            <a:schemeClr val="accent1">
+              <a:shade val="50000"/>
+            </a:schemeClr>
+          </a:lnRef>
+          <a:fillRef idx="1">
+            <a:schemeClr val="accent1"/>
+          </a:fillRef>
+          <a:effectRef idx="0">
+            <a:schemeClr val="accent1"/>
+          </a:effectRef>
+          <a:fontRef idx="minor">
+            <a:schemeClr val="lt1"/>
+          </a:fontRef>
+        </p:style>
+        <p:txBody>
+          <a:bodyPr rtlCol="0" anchor="ctr"/>
+          <a:lstStyle/>
+          <a:p>
+            <a:pPr algn="ctr"/>
+            <a:endParaRPr lang="en-US"/>
+          </a:p>
+        </p:txBody>
+      </p:sp>
+      <p:sp>
+        <p:nvSpPr>
+          <p:cNvPr id="2" name="Title 1">
+            <a:extLst>
+              <a:ext uri="{FF2B5EF4-FFF2-40B4-BE49-F238E27FC236}">
                 <a16:creationId xmlns:a16="http://schemas.microsoft.com/office/drawing/2014/main" id="{3ACEE734-6AF8-48D0-8AB1-36FBE5D4FA67}"/>
               </a:ext>
             </a:extLst>
@@ -9544,166 +9691,6 @@
 </p:sld>
 </file>
 
-<file path=ppt/slides/slide29.xml><?xml version="1.0" encoding="utf-8"?>
-<p:sld xmlns:a="http://schemas.openxmlformats.org/drawingml/2006/main" xmlns:r="http://schemas.openxmlformats.org/officeDocument/2006/relationships" xmlns:p="http://schemas.openxmlformats.org/presentationml/2006/main">
-  <p:cSld>
-    <p:spTree>
-      <p:nvGrpSpPr>
-        <p:cNvPr id="1" name=""/>
-        <p:cNvGrpSpPr/>
-        <p:nvPr/>
-      </p:nvGrpSpPr>
-      <p:grpSpPr>
-        <a:xfrm>
-          <a:off x="0" y="0"/>
-          <a:ext cx="0" cy="0"/>
-          <a:chOff x="0" y="0"/>
-          <a:chExt cx="0" cy="0"/>
-        </a:xfrm>
-      </p:grpSpPr>
-      <p:sp>
-        <p:nvSpPr>
-          <p:cNvPr id="2" name="Title 1">
-            <a:extLst>
-              <a:ext uri="{FF2B5EF4-FFF2-40B4-BE49-F238E27FC236}">
-                <a16:creationId xmlns:a16="http://schemas.microsoft.com/office/drawing/2014/main" id="{B14D7E61-E472-9F21-1DA9-153E30F096E4}"/>
-              </a:ext>
-            </a:extLst>
-          </p:cNvPr>
-          <p:cNvSpPr>
-            <a:spLocks noGrp="1"/>
-          </p:cNvSpPr>
-          <p:nvPr>
-            <p:ph type="title"/>
-          </p:nvPr>
-        </p:nvSpPr>
-        <p:spPr/>
-        <p:txBody>
-          <a:bodyPr/>
-          <a:lstStyle/>
-          <a:p>
-            <a:r>
-              <a:rPr lang="en-US" dirty="0"/>
-              <a:t>Cost of no-ml strategy</a:t>
-            </a:r>
-          </a:p>
-        </p:txBody>
-      </p:sp>
-      <p:sp>
-        <p:nvSpPr>
-          <p:cNvPr id="3" name="Content Placeholder 2">
-            <a:extLst>
-              <a:ext uri="{FF2B5EF4-FFF2-40B4-BE49-F238E27FC236}">
-                <a16:creationId xmlns:a16="http://schemas.microsoft.com/office/drawing/2014/main" id="{A4AA96FF-A42F-9FB1-7ECF-CBA43F2C9C9B}"/>
-              </a:ext>
-            </a:extLst>
-          </p:cNvPr>
-          <p:cNvSpPr>
-            <a:spLocks noGrp="1"/>
-          </p:cNvSpPr>
-          <p:nvPr>
-            <p:ph idx="1"/>
-          </p:nvPr>
-        </p:nvSpPr>
-        <p:spPr/>
-        <p:txBody>
-          <a:bodyPr>
-            <a:normAutofit fontScale="92500" lnSpcReduction="20000"/>
-          </a:bodyPr>
-          <a:lstStyle/>
-          <a:p>
-            <a:r>
-              <a:rPr lang="en-US" dirty="0"/>
-              <a:t>Assuming a uniform distribution of yeses and noes, to reach 63% of the possible yeses, the bank would call .63362*41188=26098 customers.</a:t>
-            </a:r>
-          </a:p>
-          <a:p>
-            <a:pPr lvl="1"/>
-            <a:r>
-              <a:rPr lang="en-US" dirty="0"/>
-              <a:t>11.265% (2940) will say yes, with a length of call per yes being 553.1912 seconds, for a total of 452 hours. </a:t>
-            </a:r>
-          </a:p>
-          <a:p>
-            <a:pPr lvl="1"/>
-            <a:r>
-              <a:rPr lang="en-US" dirty="0"/>
-              <a:t>88.735% (23158) will say no, with a length of call per yes being 220.8448 seconds, for a total of 1420 hours</a:t>
-            </a:r>
-          </a:p>
-          <a:p>
-            <a:pPr lvl="1"/>
-            <a:r>
-              <a:rPr lang="en-US" dirty="0"/>
-              <a:t>Lower bound cost of acquiring 63% yeses: $10/</a:t>
-            </a:r>
-            <a:r>
-              <a:rPr lang="en-US" dirty="0" err="1"/>
-              <a:t>hr</a:t>
-            </a:r>
-            <a:r>
-              <a:rPr lang="en-US" dirty="0"/>
-              <a:t>*(1870)</a:t>
-            </a:r>
-            <a:r>
-              <a:rPr lang="en-US" dirty="0" err="1"/>
-              <a:t>hrs</a:t>
-            </a:r>
-            <a:r>
-              <a:rPr lang="en-US" dirty="0"/>
-              <a:t>= $18,700+Cost(long-term customer value and reputation costs loses)+Opportunity cost of spending many employee hours on the campaign</a:t>
-            </a:r>
-          </a:p>
-          <a:p>
-            <a:pPr lvl="1"/>
-            <a:r>
-              <a:rPr lang="en-US" dirty="0"/>
-              <a:t>Upper bound cost of acquiring 63% yeses: $20/</a:t>
-            </a:r>
-            <a:r>
-              <a:rPr lang="en-US" dirty="0" err="1"/>
-              <a:t>hr</a:t>
-            </a:r>
-            <a:r>
-              <a:rPr lang="en-US" dirty="0"/>
-              <a:t>*(5850)</a:t>
-            </a:r>
-            <a:r>
-              <a:rPr lang="en-US" dirty="0" err="1"/>
-              <a:t>hrs</a:t>
-            </a:r>
-            <a:r>
-              <a:rPr lang="en-US" dirty="0"/>
-              <a:t>= $37,400 +Cost(long-term customer value and reputation costs loses) )+Opportunity cost of spending many employee hours on the campaign</a:t>
-            </a:r>
-          </a:p>
-          <a:p>
-            <a:pPr lvl="1"/>
-            <a:endParaRPr lang="en-US" dirty="0"/>
-          </a:p>
-          <a:p>
-            <a:pPr lvl="1"/>
-            <a:endParaRPr lang="en-US" dirty="0"/>
-          </a:p>
-          <a:p>
-            <a:pPr lvl="1"/>
-            <a:endParaRPr lang="en-US" dirty="0"/>
-          </a:p>
-        </p:txBody>
-      </p:sp>
-    </p:spTree>
-    <p:extLst>
-      <p:ext uri="{BB962C8B-B14F-4D97-AF65-F5344CB8AC3E}">
-        <p14:creationId xmlns:p14="http://schemas.microsoft.com/office/powerpoint/2010/main" val="1729307658"/>
-      </p:ext>
-    </p:extLst>
-  </p:cSld>
-  <p:clrMapOvr>
-    <a:masterClrMapping/>
-  </p:clrMapOvr>
-</p:sld>
-</file>
-
 <file path=ppt/slides/slide3.xml><?xml version="1.0" encoding="utf-8"?>
 <p:sld xmlns:a="http://schemas.openxmlformats.org/drawingml/2006/main" xmlns:r="http://schemas.openxmlformats.org/officeDocument/2006/relationships" xmlns:p="http://schemas.openxmlformats.org/presentationml/2006/main">
   <p:cSld>
@@ -9856,6 +9843,166 @@
           <p:cNvPr id="2" name="Title 1">
             <a:extLst>
               <a:ext uri="{FF2B5EF4-FFF2-40B4-BE49-F238E27FC236}">
+                <a16:creationId xmlns:a16="http://schemas.microsoft.com/office/drawing/2014/main" id="{B14D7E61-E472-9F21-1DA9-153E30F096E4}"/>
+              </a:ext>
+            </a:extLst>
+          </p:cNvPr>
+          <p:cNvSpPr>
+            <a:spLocks noGrp="1"/>
+          </p:cNvSpPr>
+          <p:nvPr>
+            <p:ph type="title"/>
+          </p:nvPr>
+        </p:nvSpPr>
+        <p:spPr/>
+        <p:txBody>
+          <a:bodyPr/>
+          <a:lstStyle/>
+          <a:p>
+            <a:r>
+              <a:rPr lang="en-US" dirty="0"/>
+              <a:t>Cost of no-ml strategy</a:t>
+            </a:r>
+          </a:p>
+        </p:txBody>
+      </p:sp>
+      <p:sp>
+        <p:nvSpPr>
+          <p:cNvPr id="3" name="Content Placeholder 2">
+            <a:extLst>
+              <a:ext uri="{FF2B5EF4-FFF2-40B4-BE49-F238E27FC236}">
+                <a16:creationId xmlns:a16="http://schemas.microsoft.com/office/drawing/2014/main" id="{A4AA96FF-A42F-9FB1-7ECF-CBA43F2C9C9B}"/>
+              </a:ext>
+            </a:extLst>
+          </p:cNvPr>
+          <p:cNvSpPr>
+            <a:spLocks noGrp="1"/>
+          </p:cNvSpPr>
+          <p:nvPr>
+            <p:ph idx="1"/>
+          </p:nvPr>
+        </p:nvSpPr>
+        <p:spPr/>
+        <p:txBody>
+          <a:bodyPr>
+            <a:normAutofit fontScale="92500" lnSpcReduction="20000"/>
+          </a:bodyPr>
+          <a:lstStyle/>
+          <a:p>
+            <a:r>
+              <a:rPr lang="en-US" dirty="0"/>
+              <a:t>Assuming a uniform distribution of yeses and noes, to reach 63% of the possible yeses, the bank would call .63362*41188=26098 customers.</a:t>
+            </a:r>
+          </a:p>
+          <a:p>
+            <a:pPr lvl="1"/>
+            <a:r>
+              <a:rPr lang="en-US" dirty="0"/>
+              <a:t>11.265% (2940) will say yes, with a length of call per yes being 553.1912 seconds, for a total of 452 hours. </a:t>
+            </a:r>
+          </a:p>
+          <a:p>
+            <a:pPr lvl="1"/>
+            <a:r>
+              <a:rPr lang="en-US" dirty="0"/>
+              <a:t>88.735% (23158) will say no, with a length of call per yes being 220.8448 seconds, for a total of 1420 hours</a:t>
+            </a:r>
+          </a:p>
+          <a:p>
+            <a:pPr lvl="1"/>
+            <a:r>
+              <a:rPr lang="en-US" dirty="0"/>
+              <a:t>Lower bound cost of acquiring 63% yeses: $10/</a:t>
+            </a:r>
+            <a:r>
+              <a:rPr lang="en-US" dirty="0" err="1"/>
+              <a:t>hr</a:t>
+            </a:r>
+            <a:r>
+              <a:rPr lang="en-US" dirty="0"/>
+              <a:t>*(1870)</a:t>
+            </a:r>
+            <a:r>
+              <a:rPr lang="en-US" dirty="0" err="1"/>
+              <a:t>hrs</a:t>
+            </a:r>
+            <a:r>
+              <a:rPr lang="en-US" dirty="0"/>
+              <a:t>= $18,700+Cost(long-term customer value and reputation costs loses)+Opportunity cost of spending many employee hours on the campaign</a:t>
+            </a:r>
+          </a:p>
+          <a:p>
+            <a:pPr lvl="1"/>
+            <a:r>
+              <a:rPr lang="en-US" dirty="0"/>
+              <a:t>Upper bound cost of acquiring 63% yeses: $20/</a:t>
+            </a:r>
+            <a:r>
+              <a:rPr lang="en-US" dirty="0" err="1"/>
+              <a:t>hr</a:t>
+            </a:r>
+            <a:r>
+              <a:rPr lang="en-US" dirty="0"/>
+              <a:t>*(5850)</a:t>
+            </a:r>
+            <a:r>
+              <a:rPr lang="en-US" dirty="0" err="1"/>
+              <a:t>hrs</a:t>
+            </a:r>
+            <a:r>
+              <a:rPr lang="en-US" dirty="0"/>
+              <a:t>= $37,400 +Cost(long-term customer value and reputation costs loses) )+Opportunity cost of spending many employee hours on the campaign</a:t>
+            </a:r>
+          </a:p>
+          <a:p>
+            <a:pPr lvl="1"/>
+            <a:endParaRPr lang="en-US" dirty="0"/>
+          </a:p>
+          <a:p>
+            <a:pPr lvl="1"/>
+            <a:endParaRPr lang="en-US" dirty="0"/>
+          </a:p>
+          <a:p>
+            <a:pPr lvl="1"/>
+            <a:endParaRPr lang="en-US" dirty="0"/>
+          </a:p>
+        </p:txBody>
+      </p:sp>
+    </p:spTree>
+    <p:extLst>
+      <p:ext uri="{BB962C8B-B14F-4D97-AF65-F5344CB8AC3E}">
+        <p14:creationId xmlns:p14="http://schemas.microsoft.com/office/powerpoint/2010/main" val="1729307658"/>
+      </p:ext>
+    </p:extLst>
+  </p:cSld>
+  <p:clrMapOvr>
+    <a:masterClrMapping/>
+  </p:clrMapOvr>
+</p:sld>
+</file>
+
+<file path=ppt/slides/slide31.xml><?xml version="1.0" encoding="utf-8"?>
+<p:sld xmlns:a="http://schemas.openxmlformats.org/drawingml/2006/main" xmlns:r="http://schemas.openxmlformats.org/officeDocument/2006/relationships" xmlns:p="http://schemas.openxmlformats.org/presentationml/2006/main">
+  <p:cSld>
+    <p:spTree>
+      <p:nvGrpSpPr>
+        <p:cNvPr id="1" name=""/>
+        <p:cNvGrpSpPr/>
+        <p:nvPr/>
+      </p:nvGrpSpPr>
+      <p:grpSpPr>
+        <a:xfrm>
+          <a:off x="0" y="0"/>
+          <a:ext cx="0" cy="0"/>
+          <a:chOff x="0" y="0"/>
+          <a:chExt cx="0" cy="0"/>
+        </a:xfrm>
+      </p:grpSpPr>
+      <p:sp>
+        <p:nvSpPr>
+          <p:cNvPr id="2" name="Title 1">
+            <a:extLst>
+              <a:ext uri="{FF2B5EF4-FFF2-40B4-BE49-F238E27FC236}">
                 <a16:creationId xmlns:a16="http://schemas.microsoft.com/office/drawing/2014/main" id="{1A674F87-5BD0-33F3-6898-D29B8C92871B}"/>
               </a:ext>
             </a:extLst>
@@ -9992,7 +10139,7 @@
 </p:sld>
 </file>
 
-<file path=ppt/slides/slide31.xml><?xml version="1.0" encoding="utf-8"?>
+<file path=ppt/slides/slide32.xml><?xml version="1.0" encoding="utf-8"?>
 <p:sld xmlns:a="http://schemas.openxmlformats.org/drawingml/2006/main" xmlns:r="http://schemas.openxmlformats.org/officeDocument/2006/relationships" xmlns:p="http://schemas.openxmlformats.org/presentationml/2006/main">
   <p:cSld>
     <p:bg>
@@ -11004,8 +11151,8 @@
         </p:nvSpPr>
         <p:spPr>
           <a:xfrm>
-            <a:off x="804672" y="964692"/>
-            <a:ext cx="3066937" cy="1188720"/>
+            <a:off x="446314" y="964692"/>
+            <a:ext cx="3733800" cy="1188720"/>
           </a:xfrm>
         </p:spPr>
         <p:txBody>
@@ -11039,13 +11186,13 @@
         </p:nvSpPr>
         <p:spPr>
           <a:xfrm>
-            <a:off x="803244" y="2638044"/>
-            <a:ext cx="3063765" cy="3263206"/>
+            <a:off x="337457" y="2373086"/>
+            <a:ext cx="3842657" cy="3528165"/>
           </a:xfrm>
         </p:spPr>
         <p:txBody>
           <a:bodyPr>
-            <a:normAutofit fontScale="92500" lnSpcReduction="20000"/>
+            <a:noAutofit/>
           </a:bodyPr>
           <a:lstStyle/>
           <a:p>
@@ -11069,11 +11216,16 @@
           <a:p>
             <a:r>
               <a:rPr lang="en-US" dirty="0"/>
-              <a:t>Excluded the leaked variable duration.  This variable can be used to get a more accurate model.</a:t>
-            </a:r>
-          </a:p>
-          <a:p>
-            <a:endParaRPr lang="en-US" dirty="0"/>
+              <a:t>Excluded the leaked variable </a:t>
+            </a:r>
+            <a:r>
+              <a:rPr lang="en-US" i="1" dirty="0"/>
+              <a:t>duration</a:t>
+            </a:r>
+            <a:r>
+              <a:rPr lang="en-US" dirty="0"/>
+              <a:t>.  This variable has been used (on Kaggle and elsewhere) to get a more accurate model, but is not know to the bank before a call.</a:t>
+            </a:r>
           </a:p>
         </p:txBody>
       </p:sp>

</xml_diff>

<commit_message>
update presentation with 100k clients
</commit_message>
<xml_diff>
--- a/BankMarketing.pptx
+++ b/BankMarketing.pptx
@@ -135,6 +135,11 @@
       </a:defRPr>
     </a:lvl9pPr>
   </p:defaultTextStyle>
+  <p:extLst>
+    <p:ext uri="{EFAFB233-063F-42B5-8137-9DF3F51BA10A}">
+      <p15:sldGuideLst xmlns:p15="http://schemas.microsoft.com/office/powerpoint/2012/main"/>
+    </p:ext>
+  </p:extLst>
 </p:presentation>
 </file>
 
@@ -301,7 +306,7 @@
           <a:p>
             <a:fld id="{516ACD4C-5BFD-824B-BDCF-F11299F7E332}" type="datetimeFigureOut">
               <a:rPr lang="en-US" smtClean="0"/>
-              <a:t>8/2/22</a:t>
+              <a:t>8/6/22</a:t>
             </a:fld>
             <a:endParaRPr lang="en-US"/>
           </a:p>
@@ -471,7 +476,7 @@
           <a:p>
             <a:fld id="{516ACD4C-5BFD-824B-BDCF-F11299F7E332}" type="datetimeFigureOut">
               <a:rPr lang="en-US" smtClean="0"/>
-              <a:t>8/2/22</a:t>
+              <a:t>8/6/22</a:t>
             </a:fld>
             <a:endParaRPr lang="en-US"/>
           </a:p>
@@ -651,7 +656,7 @@
           <a:p>
             <a:fld id="{516ACD4C-5BFD-824B-BDCF-F11299F7E332}" type="datetimeFigureOut">
               <a:rPr lang="en-US" smtClean="0"/>
-              <a:t>8/2/22</a:t>
+              <a:t>8/6/22</a:t>
             </a:fld>
             <a:endParaRPr lang="en-US"/>
           </a:p>
@@ -821,7 +826,7 @@
           <a:p>
             <a:fld id="{516ACD4C-5BFD-824B-BDCF-F11299F7E332}" type="datetimeFigureOut">
               <a:rPr lang="en-US" smtClean="0"/>
-              <a:t>8/2/22</a:t>
+              <a:t>8/6/22</a:t>
             </a:fld>
             <a:endParaRPr lang="en-US"/>
           </a:p>
@@ -1089,7 +1094,7 @@
           <a:p>
             <a:fld id="{516ACD4C-5BFD-824B-BDCF-F11299F7E332}" type="datetimeFigureOut">
               <a:rPr lang="en-US" smtClean="0"/>
-              <a:t>8/2/22</a:t>
+              <a:t>8/6/22</a:t>
             </a:fld>
             <a:endParaRPr lang="en-US"/>
           </a:p>
@@ -1321,7 +1326,7 @@
           <a:p>
             <a:fld id="{516ACD4C-5BFD-824B-BDCF-F11299F7E332}" type="datetimeFigureOut">
               <a:rPr lang="en-US" smtClean="0"/>
-              <a:t>8/2/22</a:t>
+              <a:t>8/6/22</a:t>
             </a:fld>
             <a:endParaRPr lang="en-US"/>
           </a:p>
@@ -1676,7 +1681,7 @@
           <a:p>
             <a:fld id="{516ACD4C-5BFD-824B-BDCF-F11299F7E332}" type="datetimeFigureOut">
               <a:rPr lang="en-US" smtClean="0"/>
-              <a:t>8/2/22</a:t>
+              <a:t>8/6/22</a:t>
             </a:fld>
             <a:endParaRPr lang="en-US"/>
           </a:p>
@@ -1817,7 +1822,7 @@
           <a:p>
             <a:fld id="{516ACD4C-5BFD-824B-BDCF-F11299F7E332}" type="datetimeFigureOut">
               <a:rPr lang="en-US" smtClean="0"/>
-              <a:t>8/2/22</a:t>
+              <a:t>8/6/22</a:t>
             </a:fld>
             <a:endParaRPr lang="en-US"/>
           </a:p>
@@ -1912,7 +1917,7 @@
           <a:p>
             <a:fld id="{516ACD4C-5BFD-824B-BDCF-F11299F7E332}" type="datetimeFigureOut">
               <a:rPr lang="en-US" smtClean="0"/>
-              <a:t>8/2/22</a:t>
+              <a:t>8/6/22</a:t>
             </a:fld>
             <a:endParaRPr lang="en-US"/>
           </a:p>
@@ -2269,7 +2274,7 @@
           <a:p>
             <a:fld id="{516ACD4C-5BFD-824B-BDCF-F11299F7E332}" type="datetimeFigureOut">
               <a:rPr lang="en-US" smtClean="0"/>
-              <a:t>8/2/22</a:t>
+              <a:t>8/6/22</a:t>
             </a:fld>
             <a:endParaRPr lang="en-US"/>
           </a:p>
@@ -2625,7 +2630,7 @@
           <a:p>
             <a:fld id="{516ACD4C-5BFD-824B-BDCF-F11299F7E332}" type="datetimeFigureOut">
               <a:rPr lang="en-US" smtClean="0"/>
-              <a:t>8/2/22</a:t>
+              <a:t>8/6/22</a:t>
             </a:fld>
             <a:endParaRPr lang="en-US"/>
           </a:p>
@@ -2865,7 +2870,7 @@
           <a:p>
             <a:fld id="{516ACD4C-5BFD-824B-BDCF-F11299F7E332}" type="datetimeFigureOut">
               <a:rPr lang="en-US" smtClean="0"/>
-              <a:t>8/2/22</a:t>
+              <a:t>8/6/22</a:t>
             </a:fld>
             <a:endParaRPr lang="en-US"/>
           </a:p>
@@ -3924,13 +3929,13 @@
         </p:nvSpPr>
         <p:spPr>
           <a:xfrm>
-            <a:off x="8312677" y="964692"/>
-            <a:ext cx="3066937" cy="1188720"/>
+            <a:off x="8055429" y="964692"/>
+            <a:ext cx="3646714" cy="820565"/>
           </a:xfrm>
         </p:spPr>
         <p:txBody>
           <a:bodyPr>
-            <a:normAutofit/>
+            <a:normAutofit fontScale="90000"/>
           </a:bodyPr>
           <a:lstStyle/>
           <a:p>
@@ -4086,70 +4091,15 @@
         </p:nvSpPr>
         <p:spPr>
           <a:xfrm>
-            <a:off x="8311249" y="2638044"/>
-            <a:ext cx="3063765" cy="3263206"/>
+            <a:off x="8055429" y="2068220"/>
+            <a:ext cx="3646714" cy="4201951"/>
           </a:xfrm>
         </p:spPr>
         <p:txBody>
           <a:bodyPr>
-            <a:normAutofit/>
+            <a:normAutofit fontScale="92500" lnSpcReduction="10000"/>
           </a:bodyPr>
           <a:lstStyle/>
-          <a:p>
-            <a:pPr>
-              <a:lnSpc>
-                <a:spcPct val="90000"/>
-              </a:lnSpc>
-            </a:pPr>
-            <a:r>
-              <a:rPr lang="en-US" sz="1100" dirty="0"/>
-              <a:t>Assuming an approximately uniform distribution of yeses and noes</a:t>
-            </a:r>
-          </a:p>
-          <a:p>
-            <a:pPr>
-              <a:lnSpc>
-                <a:spcPct val="90000"/>
-              </a:lnSpc>
-            </a:pPr>
-            <a:r>
-              <a:rPr lang="en-US" sz="1100" dirty="0"/>
-              <a:t>Intangible costs are long-term reputational damage to the company from customers being (repeatedly) inconvenienced with offers that are of no interest to them, the ensuing loss in long-term customer value, opportunity costs of having employees work on more promising directions (offer a more appropriate products to customers), etc.</a:t>
-            </a:r>
-          </a:p>
-          <a:p>
-            <a:pPr>
-              <a:lnSpc>
-                <a:spcPct val="90000"/>
-              </a:lnSpc>
-            </a:pPr>
-            <a:r>
-              <a:rPr lang="en-US" sz="1100" dirty="0"/>
-              <a:t>LB is lower bound</a:t>
-            </a:r>
-          </a:p>
-          <a:p>
-            <a:pPr>
-              <a:lnSpc>
-                <a:spcPct val="90000"/>
-              </a:lnSpc>
-            </a:pPr>
-            <a:r>
-              <a:rPr lang="en-US" sz="1100" dirty="0"/>
-              <a:t>UB is upper bound</a:t>
-            </a:r>
-          </a:p>
-          <a:p>
-            <a:pPr>
-              <a:lnSpc>
-                <a:spcPct val="90000"/>
-              </a:lnSpc>
-            </a:pPr>
-            <a:r>
-              <a:rPr lang="en-US" sz="1100" dirty="0"/>
-              <a:t>Mixed strategy is strategy of identifying as positives any clients for which the model predicts their probability of saying a yes as at least 30%</a:t>
-            </a:r>
-          </a:p>
           <a:p>
             <a:pPr marL="0" indent="0">
               <a:lnSpc>
@@ -4157,7 +4107,76 @@
               </a:lnSpc>
               <a:buNone/>
             </a:pPr>
-            <a:endParaRPr lang="en-US" sz="1100" dirty="0"/>
+            <a:r>
+              <a:rPr lang="en-US" sz="1100" b="1" dirty="0"/>
+              <a:t>FOOTNOTES</a:t>
+            </a:r>
+          </a:p>
+          <a:p>
+            <a:pPr>
+              <a:lnSpc>
+                <a:spcPct val="90000"/>
+              </a:lnSpc>
+            </a:pPr>
+            <a:r>
+              <a:rPr lang="en-US" sz="1400" dirty="0"/>
+              <a:t>Assuming an approximately uniform distribution of yeses and noes</a:t>
+            </a:r>
+          </a:p>
+          <a:p>
+            <a:pPr>
+              <a:lnSpc>
+                <a:spcPct val="90000"/>
+              </a:lnSpc>
+            </a:pPr>
+            <a:r>
+              <a:rPr lang="en-US" sz="1400" dirty="0"/>
+              <a:t>ML model assumes we get data on customers for whom deposit data is not available (same size as our dataset for ease of calculations)</a:t>
+            </a:r>
+          </a:p>
+          <a:p>
+            <a:pPr>
+              <a:lnSpc>
+                <a:spcPct val="90000"/>
+              </a:lnSpc>
+            </a:pPr>
+            <a:r>
+              <a:rPr lang="en-US" sz="1400" dirty="0"/>
+              <a:t>Intangible costs are long-term reputational damage to the company from customers being (repeatedly) inconvenienced with offers that are of no interest to them, the ensuing loss in long-term customer value, opportunity costs of having employees work on more promising directions (offer a more appropriate products to customers), etc.</a:t>
+            </a:r>
+          </a:p>
+          <a:p>
+            <a:pPr>
+              <a:lnSpc>
+                <a:spcPct val="90000"/>
+              </a:lnSpc>
+            </a:pPr>
+            <a:r>
+              <a:rPr lang="en-US" sz="1400" dirty="0"/>
+              <a:t>LB is lower bound</a:t>
+            </a:r>
+          </a:p>
+          <a:p>
+            <a:pPr>
+              <a:lnSpc>
+                <a:spcPct val="90000"/>
+              </a:lnSpc>
+            </a:pPr>
+            <a:r>
+              <a:rPr lang="en-US" sz="1400" dirty="0"/>
+              <a:t>UB is upper bound</a:t>
+            </a:r>
+          </a:p>
+          <a:p>
+            <a:pPr>
+              <a:lnSpc>
+                <a:spcPct val="90000"/>
+              </a:lnSpc>
+            </a:pPr>
+            <a:r>
+              <a:rPr lang="en-US" sz="1400" dirty="0"/>
+              <a:t>Mixed strategy is strategy of identifying as positives any clients for which the model predicts their probability of saying a yes as at least 30%</a:t>
+            </a:r>
           </a:p>
           <a:p>
             <a:pPr lvl="1">
@@ -4192,7 +4211,7 @@
           <p:nvPr>
             <p:extLst>
               <p:ext uri="{D42A27DB-BD31-4B8C-83A1-F6EECF244321}">
-                <p14:modId xmlns:p14="http://schemas.microsoft.com/office/powerpoint/2010/main" val="4162853071"/>
+                <p14:modId xmlns:p14="http://schemas.microsoft.com/office/powerpoint/2010/main" val="573608798"/>
               </p:ext>
             </p:extLst>
           </p:nvPr>
@@ -4632,12 +4651,12 @@
                         <a:defRPr/>
                       </a:pPr>
                       <a:r>
-                        <a:rPr lang="en-US" sz="1000" cap="none" spc="0">
+                        <a:rPr lang="en-US" sz="1000" cap="none" spc="0" dirty="0">
                           <a:solidFill>
                             <a:schemeClr val="tx1"/>
                           </a:solidFill>
                         </a:rPr>
-                        <a:t>452 </a:t>
+                        <a:t>1097 </a:t>
                       </a:r>
                     </a:p>
                   </a:txBody>
@@ -4668,12 +4687,12 @@
                     <a:lstStyle/>
                     <a:p>
                       <a:r>
-                        <a:rPr lang="en-US" sz="1000" cap="none" spc="0">
+                        <a:rPr lang="en-US" sz="1000" cap="none" spc="0" dirty="0">
                           <a:solidFill>
                             <a:schemeClr val="tx1"/>
                           </a:solidFill>
                         </a:rPr>
-                        <a:t>1420</a:t>
+                        <a:t>3448</a:t>
                       </a:r>
                     </a:p>
                   </a:txBody>
@@ -4704,17 +4723,17 @@
                     <a:lstStyle/>
                     <a:p>
                       <a:r>
-                        <a:rPr lang="en-US" sz="1000" cap="none" spc="0">
+                        <a:rPr lang="en-US" sz="1000" cap="none" spc="0" dirty="0">
                           <a:solidFill>
                             <a:schemeClr val="tx1"/>
                           </a:solidFill>
                         </a:rPr>
-                        <a:t>$18700+</a:t>
+                        <a:t>$45402+</a:t>
                       </a:r>
                     </a:p>
                     <a:p>
                       <a:r>
-                        <a:rPr lang="en-US" sz="1000" cap="none" spc="0">
+                        <a:rPr lang="en-US" sz="1000" cap="none" spc="0" dirty="0">
                           <a:solidFill>
                             <a:schemeClr val="tx1"/>
                           </a:solidFill>
@@ -4750,17 +4769,17 @@
                     <a:lstStyle/>
                     <a:p>
                       <a:r>
-                        <a:rPr lang="en-US" sz="1000" cap="none" spc="0">
+                        <a:rPr lang="en-US" sz="1000" cap="none" spc="0" dirty="0">
                           <a:solidFill>
                             <a:schemeClr val="tx1"/>
                           </a:solidFill>
                         </a:rPr>
-                        <a:t>$37400+</a:t>
+                        <a:t>$90803+</a:t>
                       </a:r>
                     </a:p>
                     <a:p>
                       <a:r>
-                        <a:rPr lang="en-US" sz="1000" cap="none" spc="0">
+                        <a:rPr lang="en-US" sz="1000" cap="none" spc="0" dirty="0">
                           <a:solidFill>
                             <a:schemeClr val="tx1"/>
                           </a:solidFill>
@@ -4844,53 +4863,12 @@
                     <a:lstStyle/>
                     <a:p>
                       <a:r>
-                        <a:rPr lang="en-US" sz="1000" cap="none" spc="0">
+                        <a:rPr lang="en-US" sz="1000" cap="none" spc="0" dirty="0">
                           <a:solidFill>
                             <a:schemeClr val="tx1"/>
                           </a:solidFill>
                         </a:rPr>
-                        <a:t>452</a:t>
-                      </a:r>
-                    </a:p>
-                  </a:txBody>
-                  <a:tcPr marL="0" marR="45391" marT="18156" marB="136173">
-                    <a:lnL w="12700" cmpd="sng">
-                      <a:noFill/>
-                      <a:prstDash val="solid"/>
-                    </a:lnL>
-                    <a:lnR w="12700" cmpd="sng">
-                      <a:noFill/>
-                      <a:prstDash val="solid"/>
-                    </a:lnR>
-                    <a:lnT w="6350" cap="flat" cmpd="sng" algn="ctr">
-                      <a:solidFill>
-                        <a:schemeClr val="tx1"/>
-                      </a:solidFill>
-                      <a:prstDash val="solid"/>
-                    </a:lnT>
-                    <a:lnB w="12700" cmpd="sng">
-                      <a:noFill/>
-                      <a:prstDash val="solid"/>
-                    </a:lnB>
-                    <a:solidFill>
-                      <a:schemeClr val="bg1">
-                        <a:lumMod val="95000"/>
-                      </a:schemeClr>
-                    </a:solidFill>
-                  </a:tcPr>
-                </a:tc>
-                <a:tc>
-                  <a:txBody>
-                    <a:bodyPr/>
-                    <a:lstStyle/>
-                    <a:p>
-                      <a:r>
-                        <a:rPr lang="en-US" sz="1000" cap="none" spc="0">
-                          <a:solidFill>
-                            <a:schemeClr val="tx1"/>
-                          </a:solidFill>
-                        </a:rPr>
-                        <a:t>280</a:t>
+                        <a:t>1097</a:t>
                       </a:r>
                     </a:p>
                   </a:txBody>
@@ -4931,17 +4909,7 @@
                             <a:schemeClr val="tx1"/>
                           </a:solidFill>
                         </a:rPr>
-                        <a:t>$7320+</a:t>
-                      </a:r>
-                    </a:p>
-                    <a:p>
-                      <a:r>
-                        <a:rPr lang="en-US" sz="1000" cap="none" spc="0" dirty="0">
-                          <a:solidFill>
-                            <a:schemeClr val="tx1"/>
-                          </a:solidFill>
-                        </a:rPr>
-                        <a:t>C(intangible low)</a:t>
+                        <a:t>680</a:t>
                       </a:r>
                     </a:p>
                   </a:txBody>
@@ -4982,7 +4950,58 @@
                             <a:schemeClr val="tx1"/>
                           </a:solidFill>
                         </a:rPr>
-                        <a:t>$14640+</a:t>
+                        <a:t>$17772+</a:t>
+                      </a:r>
+                    </a:p>
+                    <a:p>
+                      <a:r>
+                        <a:rPr lang="en-US" sz="1000" cap="none" spc="0" dirty="0">
+                          <a:solidFill>
+                            <a:schemeClr val="tx1"/>
+                          </a:solidFill>
+                        </a:rPr>
+                        <a:t>C(intangible low)</a:t>
+                      </a:r>
+                    </a:p>
+                  </a:txBody>
+                  <a:tcPr marL="0" marR="45391" marT="18156" marB="136173">
+                    <a:lnL w="12700" cmpd="sng">
+                      <a:noFill/>
+                      <a:prstDash val="solid"/>
+                    </a:lnL>
+                    <a:lnR w="12700" cmpd="sng">
+                      <a:noFill/>
+                      <a:prstDash val="solid"/>
+                    </a:lnR>
+                    <a:lnT w="6350" cap="flat" cmpd="sng" algn="ctr">
+                      <a:solidFill>
+                        <a:schemeClr val="tx1"/>
+                      </a:solidFill>
+                      <a:prstDash val="solid"/>
+                    </a:lnT>
+                    <a:lnB w="12700" cmpd="sng">
+                      <a:noFill/>
+                      <a:prstDash val="solid"/>
+                    </a:lnB>
+                    <a:solidFill>
+                      <a:schemeClr val="bg1">
+                        <a:lumMod val="95000"/>
+                      </a:schemeClr>
+                    </a:solidFill>
+                  </a:tcPr>
+                </a:tc>
+                <a:tc>
+                  <a:txBody>
+                    <a:bodyPr/>
+                    <a:lstStyle/>
+                    <a:p>
+                      <a:r>
+                        <a:rPr lang="en-US" sz="1000" cap="none" spc="0" dirty="0">
+                          <a:solidFill>
+                            <a:schemeClr val="tx1"/>
+                          </a:solidFill>
+                        </a:rPr>
+                        <a:t>$35544+</a:t>
                       </a:r>
                     </a:p>
                     <a:p>
@@ -5086,7 +5105,7 @@
                             <a:schemeClr val="tx1"/>
                           </a:solidFill>
                         </a:rPr>
-                        <a:t>571</a:t>
+                        <a:t>1386</a:t>
                       </a:r>
                     </a:p>
                   </a:txBody>
@@ -5125,7 +5144,7 @@
                             <a:schemeClr val="tx1"/>
                           </a:solidFill>
                         </a:rPr>
-                        <a:t>807</a:t>
+                        <a:t>1959</a:t>
                       </a:r>
                     </a:p>
                   </a:txBody>
@@ -5164,7 +5183,7 @@
                             <a:schemeClr val="tx1"/>
                           </a:solidFill>
                         </a:rPr>
-                        <a:t>$13783+</a:t>
+                        <a:t>$33464+</a:t>
                       </a:r>
                     </a:p>
                     <a:p>
@@ -5237,7 +5256,7 @@
                             <a:schemeClr val="tx1"/>
                           </a:solidFill>
                         </a:rPr>
-                        <a:t>$27567+</a:t>
+                        <a:t>$66927+</a:t>
                       </a:r>
                     </a:p>
                     <a:p>
@@ -5394,10 +5413,10 @@
                       <a:r>
                         <a:rPr lang="en-US" sz="1000" cap="none" spc="0" dirty="0">
                           <a:solidFill>
-                            <a:schemeClr val="tx1"/>
+                            <a:srgbClr val="FF0000"/>
                           </a:solidFill>
                         </a:rPr>
-                        <a:t>1140</a:t>
+                        <a:t>2768</a:t>
                       </a:r>
                     </a:p>
                   </a:txBody>
@@ -5446,10 +5465,10 @@
                       <a:r>
                         <a:rPr lang="en-US" sz="1000" cap="none" spc="0" dirty="0">
                           <a:solidFill>
-                            <a:schemeClr val="tx1"/>
+                            <a:srgbClr val="FF0000"/>
                           </a:solidFill>
                         </a:rPr>
-                        <a:t>$11380+(C(intangible high)-C(intangible low))</a:t>
+                        <a:t>$27629+(C(intangible high)-C(intangible low))</a:t>
                       </a:r>
                     </a:p>
                   </a:txBody>
@@ -5498,10 +5517,10 @@
                       <a:r>
                         <a:rPr lang="en-US" sz="1000" cap="none" spc="0" dirty="0">
                           <a:solidFill>
-                            <a:schemeClr val="tx1"/>
+                            <a:srgbClr val="FF0000"/>
                           </a:solidFill>
                         </a:rPr>
-                        <a:t>$22760+(C(intangible high)-C(intangible low))</a:t>
+                        <a:t>$55259+(C(intangible high)-C(intangible low))</a:t>
                       </a:r>
                     </a:p>
                     <a:p>
@@ -5599,10 +5618,10 @@
                       <a:r>
                         <a:rPr lang="en-US" sz="1000" cap="none" spc="0" dirty="0">
                           <a:solidFill>
-                            <a:schemeClr val="tx1"/>
+                            <a:srgbClr val="FF0000"/>
                           </a:solidFill>
                         </a:rPr>
-                        <a:t>119</a:t>
+                        <a:t>289</a:t>
                       </a:r>
                     </a:p>
                   </a:txBody>
@@ -5634,10 +5653,10 @@
                       <a:r>
                         <a:rPr lang="en-US" sz="1000" cap="none" spc="0" dirty="0">
                           <a:solidFill>
-                            <a:schemeClr val="tx1"/>
+                            <a:srgbClr val="FF0000"/>
                           </a:solidFill>
                         </a:rPr>
-                        <a:t>527</a:t>
+                        <a:t>1279</a:t>
                       </a:r>
                     </a:p>
                   </a:txBody>
@@ -5686,10 +5705,10 @@
                       <a:r>
                         <a:rPr lang="en-US" sz="1000" cap="none" spc="0" dirty="0">
                           <a:solidFill>
-                            <a:schemeClr val="tx1"/>
+                            <a:srgbClr val="FF0000"/>
                           </a:solidFill>
                         </a:rPr>
-                        <a:t>$6463+(C(intangible medium)-C(intangible low))</a:t>
+                        <a:t>$15691+(C(intangible medium)-C(intangible low))</a:t>
                       </a:r>
                     </a:p>
                     <a:p>
@@ -5762,10 +5781,10 @@
                       <a:r>
                         <a:rPr lang="en-US" sz="1000" cap="none" spc="0" dirty="0">
                           <a:solidFill>
-                            <a:schemeClr val="tx1"/>
+                            <a:srgbClr val="FF0000"/>
                           </a:solidFill>
                         </a:rPr>
-                        <a:t>$12926+(C(intangible medium)-C(intangible low))</a:t>
+                        <a:t>$31383+(C(intangible medium)-C(intangible low))</a:t>
                       </a:r>
                     </a:p>
                     <a:p>
@@ -7943,7 +7962,7 @@
         <p:spPr/>
         <p:txBody>
           <a:bodyPr>
-            <a:normAutofit fontScale="92500" lnSpcReduction="10000"/>
+            <a:normAutofit fontScale="92500" lnSpcReduction="20000"/>
           </a:bodyPr>
           <a:lstStyle/>
           <a:p>
@@ -7966,6 +7985,17 @@
                 <a:latin typeface="Arial" panose="020B0604020202020204" pitchFamily="34" charset="0"/>
               </a:rPr>
               <a:t>Originally 21 features including demographic variables, number of campaign contacts, success rate of previous campaign, as well as economic indicators (such as Euribor 3-month rate)</a:t>
+            </a:r>
+          </a:p>
+          <a:p>
+            <a:r>
+              <a:rPr lang="en-US" dirty="0">
+                <a:solidFill>
+                  <a:srgbClr val="123654"/>
+                </a:solidFill>
+                <a:latin typeface="Arial" panose="020B0604020202020204" pitchFamily="34" charset="0"/>
+              </a:rPr>
+              <a:t>41188 observations</a:t>
             </a:r>
           </a:p>
           <a:p>

</xml_diff>

<commit_message>
add R Shiny app
</commit_message>
<xml_diff>
--- a/BankMarketing.pptx
+++ b/BankMarketing.pptx
@@ -4211,14 +4211,14 @@
           <p:nvPr>
             <p:extLst>
               <p:ext uri="{D42A27DB-BD31-4B8C-83A1-F6EECF244321}">
-                <p14:modId xmlns:p14="http://schemas.microsoft.com/office/powerpoint/2010/main" val="646146264"/>
+                <p14:modId xmlns:p14="http://schemas.microsoft.com/office/powerpoint/2010/main" val="3805671823"/>
               </p:ext>
             </p:extLst>
           </p:nvPr>
         </p:nvGraphicFramePr>
         <p:xfrm>
-          <a:off x="1048624" y="1308683"/>
-          <a:ext cx="6487982" cy="4756559"/>
+          <a:off x="978414" y="1128683"/>
+          <a:ext cx="6558191" cy="4936559"/>
         </p:xfrm>
         <a:graphic>
           <a:graphicData uri="http://schemas.openxmlformats.org/drawingml/2006/table">
@@ -4228,35 +4228,35 @@
                 <a:tableStyleId>{5C22544A-7EE6-4342-B048-85BDC9FD1C3A}</a:tableStyleId>
               </a:tblPr>
               <a:tblGrid>
-                <a:gridCol w="750445">
+                <a:gridCol w="758566">
                   <a:extLst>
                     <a:ext uri="{9D8B030D-6E8A-4147-A177-3AD203B41FA5}">
                       <a16:colId xmlns:a16="http://schemas.microsoft.com/office/drawing/2014/main" val="2780349557"/>
                     </a:ext>
                   </a:extLst>
                 </a:gridCol>
-                <a:gridCol w="1055877">
+                <a:gridCol w="1067303">
                   <a:extLst>
                     <a:ext uri="{9D8B030D-6E8A-4147-A177-3AD203B41FA5}">
                       <a16:colId xmlns:a16="http://schemas.microsoft.com/office/drawing/2014/main" val="1762101800"/>
                     </a:ext>
                   </a:extLst>
                 </a:gridCol>
-                <a:gridCol w="1197100">
+                <a:gridCol w="1210054">
                   <a:extLst>
                     <a:ext uri="{9D8B030D-6E8A-4147-A177-3AD203B41FA5}">
                       <a16:colId xmlns:a16="http://schemas.microsoft.com/office/drawing/2014/main" val="1257051223"/>
                     </a:ext>
                   </a:extLst>
                 </a:gridCol>
-                <a:gridCol w="1742280">
+                <a:gridCol w="1761134">
                   <a:extLst>
                     <a:ext uri="{9D8B030D-6E8A-4147-A177-3AD203B41FA5}">
                       <a16:colId xmlns:a16="http://schemas.microsoft.com/office/drawing/2014/main" val="2918621000"/>
                     </a:ext>
                   </a:extLst>
                 </a:gridCol>
-                <a:gridCol w="1742280">
+                <a:gridCol w="1761134">
                   <a:extLst>
                     <a:ext uri="{9D8B030D-6E8A-4147-A177-3AD203B41FA5}">
                       <a16:colId xmlns:a16="http://schemas.microsoft.com/office/drawing/2014/main" val="107609493"/>
@@ -4264,7 +4264,7 @@
                   </a:extLst>
                 </a:gridCol>
               </a:tblGrid>
-              <a:tr h="746097">
+              <a:tr h="774331">
                 <a:tc>
                   <a:txBody>
                     <a:bodyPr/>
@@ -4574,7 +4574,7 @@
                   </a:ext>
                 </a:extLst>
               </a:tr>
-              <a:tr h="560162">
+              <a:tr h="581360">
                 <a:tc>
                   <a:txBody>
                     <a:bodyPr/>
@@ -4815,7 +4815,7 @@
                   </a:ext>
                 </a:extLst>
               </a:tr>
-              <a:tr h="746097">
+              <a:tr h="774331">
                 <a:tc>
                   <a:txBody>
                     <a:bodyPr/>
@@ -5054,7 +5054,7 @@
                   </a:ext>
                 </a:extLst>
               </a:tr>
-              <a:tr h="746097">
+              <a:tr h="774331">
                 <a:tc>
                   <a:txBody>
                     <a:bodyPr/>
@@ -5324,7 +5324,7 @@
                   </a:ext>
                 </a:extLst>
               </a:tr>
-              <a:tr h="979053">
+              <a:tr h="1016103">
                 <a:tc>
                   <a:txBody>
                     <a:bodyPr/>
@@ -5557,7 +5557,7 @@
                   </a:ext>
                 </a:extLst>
               </a:tr>
-              <a:tr h="979053">
+              <a:tr h="1016103">
                 <a:tc>
                   <a:txBody>
                     <a:bodyPr/>

</xml_diff>